<commit_message>
first pass through lessons, with some cosmetic changes only
</commit_message>
<xml_diff>
--- a/Slides/Lesson 10.2 Stateful Objects and Stable Identities.pptx
+++ b/Slides/Lesson 10.2 Stateful Objects and Stable Identities.pptx
@@ -221,7 +221,7 @@
           <a:p>
             <a:fld id="{EB090A22-8349-45D9-89D6-BB7F8FFEA7C2}" type="datetimeFigureOut">
               <a:rPr lang="en-US" smtClean="0"/>
-              <a:t>11/8/2015</a:t>
+              <a:t>11/4/2016</a:t>
             </a:fld>
             <a:endParaRPr lang="en-US"/>
           </a:p>
@@ -285,38 +285,37 @@
           <a:p>
             <a:pPr lvl="0"/>
             <a:r>
-              <a:rPr lang="en-US" smtClean="0"/>
+              <a:rPr lang="en-US"/>
               <a:t>Click to edit Master text styles</a:t>
             </a:r>
           </a:p>
           <a:p>
             <a:pPr lvl="1"/>
             <a:r>
-              <a:rPr lang="en-US" smtClean="0"/>
+              <a:rPr lang="en-US"/>
               <a:t>Second level</a:t>
             </a:r>
           </a:p>
           <a:p>
             <a:pPr lvl="2"/>
             <a:r>
-              <a:rPr lang="en-US" smtClean="0"/>
+              <a:rPr lang="en-US"/>
               <a:t>Third level</a:t>
             </a:r>
           </a:p>
           <a:p>
             <a:pPr lvl="3"/>
             <a:r>
-              <a:rPr lang="en-US" smtClean="0"/>
+              <a:rPr lang="en-US"/>
               <a:t>Fourth level</a:t>
             </a:r>
           </a:p>
           <a:p>
             <a:pPr lvl="4"/>
             <a:r>
-              <a:rPr lang="en-US" smtClean="0"/>
+              <a:rPr lang="en-US"/>
               <a:t>Fifth level</a:t>
             </a:r>
-            <a:endParaRPr lang="en-US"/>
           </a:p>
         </p:txBody>
       </p:sp>
@@ -695,10 +694,9 @@
           <a:lstStyle/>
           <a:p>
             <a:r>
-              <a:rPr lang="en-US" smtClean="0"/>
+              <a:rPr lang="en-US"/>
               <a:t>Click to edit Master title style</a:t>
             </a:r>
-            <a:endParaRPr lang="en-US"/>
           </a:p>
         </p:txBody>
       </p:sp>
@@ -814,10 +812,9 @@
           </a:lstStyle>
           <a:p>
             <a:r>
-              <a:rPr lang="en-US" smtClean="0"/>
+              <a:rPr lang="en-US"/>
               <a:t>Click to edit Master subtitle style</a:t>
             </a:r>
-            <a:endParaRPr lang="en-US"/>
           </a:p>
         </p:txBody>
       </p:sp>
@@ -838,7 +835,7 @@
           <a:p>
             <a:fld id="{2F1F79F5-7BEC-496A-AFC7-876E38F64D71}" type="datetime1">
               <a:rPr lang="en-US" smtClean="0"/>
-              <a:t>11/8/2015</a:t>
+              <a:t>11/4/2016</a:t>
             </a:fld>
             <a:endParaRPr lang="en-US"/>
           </a:p>
@@ -896,13 +893,6 @@
   <p:clrMapOvr>
     <a:masterClrMapping/>
   </p:clrMapOvr>
-  <p:timing>
-    <p:tnLst>
-      <p:par>
-        <p:cTn id="1" dur="indefinite" restart="never" nodeType="tmRoot"/>
-      </p:par>
-    </p:tnLst>
-  </p:timing>
 </p:sldLayout>
 </file>
 
@@ -939,10 +929,9 @@
           <a:lstStyle/>
           <a:p>
             <a:r>
-              <a:rPr lang="en-US" smtClean="0"/>
+              <a:rPr lang="en-US"/>
               <a:t>Click to edit Master title style</a:t>
             </a:r>
-            <a:endParaRPr lang="en-US"/>
           </a:p>
         </p:txBody>
       </p:sp>
@@ -963,7 +952,7 @@
           <a:p>
             <a:fld id="{2F7B77F5-1464-4F6B-92A8-64FC8A508293}" type="datetime1">
               <a:rPr lang="en-US" smtClean="0"/>
-              <a:t>11/8/2015</a:t>
+              <a:t>11/4/2016</a:t>
             </a:fld>
             <a:endParaRPr lang="en-US"/>
           </a:p>
@@ -1021,13 +1010,6 @@
   <p:clrMapOvr>
     <a:masterClrMapping/>
   </p:clrMapOvr>
-  <p:timing>
-    <p:tnLst>
-      <p:par>
-        <p:cTn id="1" dur="indefinite" restart="never" nodeType="tmRoot"/>
-      </p:par>
-    </p:tnLst>
-  </p:timing>
 </p:sldLayout>
 </file>
 
@@ -1065,7 +1047,7 @@
           <a:p>
             <a:fld id="{0A05703A-7669-4FEA-9056-25299B4D29D4}" type="datetime1">
               <a:rPr lang="en-US" smtClean="0"/>
-              <a:t>11/8/2015</a:t>
+              <a:t>11/4/2016</a:t>
             </a:fld>
             <a:endParaRPr lang="en-US"/>
           </a:p>
@@ -1168,10 +1150,9 @@
           </a:lstStyle>
           <a:p>
             <a:r>
-              <a:rPr lang="en-US" smtClean="0"/>
+              <a:rPr lang="en-US"/>
               <a:t>Click to edit Master title style</a:t>
             </a:r>
-            <a:endParaRPr lang="en-US"/>
           </a:p>
         </p:txBody>
       </p:sp>
@@ -1225,38 +1206,37 @@
           <a:p>
             <a:pPr lvl="0"/>
             <a:r>
-              <a:rPr lang="en-US" smtClean="0"/>
+              <a:rPr lang="en-US"/>
               <a:t>Click to edit Master text styles</a:t>
             </a:r>
           </a:p>
           <a:p>
             <a:pPr lvl="1"/>
             <a:r>
-              <a:rPr lang="en-US" smtClean="0"/>
+              <a:rPr lang="en-US"/>
               <a:t>Second level</a:t>
             </a:r>
           </a:p>
           <a:p>
             <a:pPr lvl="2"/>
             <a:r>
-              <a:rPr lang="en-US" smtClean="0"/>
+              <a:rPr lang="en-US"/>
               <a:t>Third level</a:t>
             </a:r>
           </a:p>
           <a:p>
             <a:pPr lvl="3"/>
             <a:r>
-              <a:rPr lang="en-US" smtClean="0"/>
+              <a:rPr lang="en-US"/>
               <a:t>Fourth level</a:t>
             </a:r>
           </a:p>
           <a:p>
             <a:pPr lvl="4"/>
             <a:r>
-              <a:rPr lang="en-US" smtClean="0"/>
+              <a:rPr lang="en-US"/>
               <a:t>Fifth level</a:t>
             </a:r>
-            <a:endParaRPr lang="en-US"/>
           </a:p>
         </p:txBody>
       </p:sp>
@@ -1319,7 +1299,7 @@
           <a:p>
             <a:pPr lvl="0"/>
             <a:r>
-              <a:rPr lang="en-US" smtClean="0"/>
+              <a:rPr lang="en-US"/>
               <a:t>Click to edit Master text styles</a:t>
             </a:r>
           </a:p>
@@ -1342,7 +1322,7 @@
           <a:p>
             <a:fld id="{6E5077B5-BB57-49DB-88CA-226A139E5C01}" type="datetime1">
               <a:rPr lang="en-US" smtClean="0"/>
-              <a:t>11/8/2015</a:t>
+              <a:t>11/4/2016</a:t>
             </a:fld>
             <a:endParaRPr lang="en-US"/>
           </a:p>
@@ -1445,10 +1425,9 @@
           </a:lstStyle>
           <a:p>
             <a:r>
-              <a:rPr lang="en-US" smtClean="0"/>
+              <a:rPr lang="en-US"/>
               <a:t>Click to edit Master title style</a:t>
             </a:r>
-            <a:endParaRPr lang="en-US"/>
           </a:p>
         </p:txBody>
       </p:sp>
@@ -1572,7 +1551,7 @@
           <a:p>
             <a:pPr lvl="0"/>
             <a:r>
-              <a:rPr lang="en-US" smtClean="0"/>
+              <a:rPr lang="en-US"/>
               <a:t>Click to edit Master text styles</a:t>
             </a:r>
           </a:p>
@@ -1595,7 +1574,7 @@
           <a:p>
             <a:fld id="{C48D9447-CBD6-49A1-89FD-8512A8CF8999}" type="datetime1">
               <a:rPr lang="en-US" smtClean="0"/>
-              <a:t>11/8/2015</a:t>
+              <a:t>11/4/2016</a:t>
             </a:fld>
             <a:endParaRPr lang="en-US"/>
           </a:p>
@@ -1689,10 +1668,9 @@
           <a:lstStyle/>
           <a:p>
             <a:r>
-              <a:rPr lang="en-US" smtClean="0"/>
+              <a:rPr lang="en-US"/>
               <a:t>Click to edit Master title style</a:t>
             </a:r>
-            <a:endParaRPr lang="en-US"/>
           </a:p>
         </p:txBody>
       </p:sp>
@@ -1713,38 +1691,37 @@
           <a:p>
             <a:pPr lvl="0"/>
             <a:r>
-              <a:rPr lang="en-US" smtClean="0"/>
+              <a:rPr lang="en-US"/>
               <a:t>Click to edit Master text styles</a:t>
             </a:r>
           </a:p>
           <a:p>
             <a:pPr lvl="1"/>
             <a:r>
-              <a:rPr lang="en-US" smtClean="0"/>
+              <a:rPr lang="en-US"/>
               <a:t>Second level</a:t>
             </a:r>
           </a:p>
           <a:p>
             <a:pPr lvl="2"/>
             <a:r>
-              <a:rPr lang="en-US" smtClean="0"/>
+              <a:rPr lang="en-US"/>
               <a:t>Third level</a:t>
             </a:r>
           </a:p>
           <a:p>
             <a:pPr lvl="3"/>
             <a:r>
-              <a:rPr lang="en-US" smtClean="0"/>
+              <a:rPr lang="en-US"/>
               <a:t>Fourth level</a:t>
             </a:r>
           </a:p>
           <a:p>
             <a:pPr lvl="4"/>
             <a:r>
-              <a:rPr lang="en-US" smtClean="0"/>
+              <a:rPr lang="en-US"/>
               <a:t>Fifth level</a:t>
             </a:r>
-            <a:endParaRPr lang="en-US"/>
           </a:p>
         </p:txBody>
       </p:sp>
@@ -1765,7 +1742,7 @@
           <a:p>
             <a:fld id="{A3639A2A-823D-48B7-9ACE-7FAF42870BA9}" type="datetime1">
               <a:rPr lang="en-US" smtClean="0"/>
-              <a:t>11/8/2015</a:t>
+              <a:t>11/4/2016</a:t>
             </a:fld>
             <a:endParaRPr lang="en-US"/>
           </a:p>
@@ -1864,10 +1841,9 @@
           <a:lstStyle/>
           <a:p>
             <a:r>
-              <a:rPr lang="en-US" smtClean="0"/>
+              <a:rPr lang="en-US"/>
               <a:t>Click to edit Master title style</a:t>
             </a:r>
-            <a:endParaRPr lang="en-US"/>
           </a:p>
         </p:txBody>
       </p:sp>
@@ -1893,38 +1869,37 @@
           <a:p>
             <a:pPr lvl="0"/>
             <a:r>
-              <a:rPr lang="en-US" smtClean="0"/>
+              <a:rPr lang="en-US"/>
               <a:t>Click to edit Master text styles</a:t>
             </a:r>
           </a:p>
           <a:p>
             <a:pPr lvl="1"/>
             <a:r>
-              <a:rPr lang="en-US" smtClean="0"/>
+              <a:rPr lang="en-US"/>
               <a:t>Second level</a:t>
             </a:r>
           </a:p>
           <a:p>
             <a:pPr lvl="2"/>
             <a:r>
-              <a:rPr lang="en-US" smtClean="0"/>
+              <a:rPr lang="en-US"/>
               <a:t>Third level</a:t>
             </a:r>
           </a:p>
           <a:p>
             <a:pPr lvl="3"/>
             <a:r>
-              <a:rPr lang="en-US" smtClean="0"/>
+              <a:rPr lang="en-US"/>
               <a:t>Fourth level</a:t>
             </a:r>
           </a:p>
           <a:p>
             <a:pPr lvl="4"/>
             <a:r>
-              <a:rPr lang="en-US" smtClean="0"/>
+              <a:rPr lang="en-US"/>
               <a:t>Fifth level</a:t>
             </a:r>
-            <a:endParaRPr lang="en-US"/>
           </a:p>
         </p:txBody>
       </p:sp>
@@ -1945,7 +1920,7 @@
           <a:p>
             <a:fld id="{ED1B6996-82E9-463C-972C-7B56056E426C}" type="datetime1">
               <a:rPr lang="en-US" smtClean="0"/>
-              <a:t>11/8/2015</a:t>
+              <a:t>11/4/2016</a:t>
             </a:fld>
             <a:endParaRPr lang="en-US"/>
           </a:p>
@@ -2003,13 +1978,6 @@
   <p:clrMapOvr>
     <a:masterClrMapping/>
   </p:clrMapOvr>
-  <p:timing>
-    <p:tnLst>
-      <p:par>
-        <p:cTn id="1" dur="indefinite" restart="never" nodeType="tmRoot"/>
-      </p:par>
-    </p:tnLst>
-  </p:timing>
 </p:sldLayout>
 </file>
 
@@ -2052,10 +2020,9 @@
           <a:lstStyle/>
           <a:p>
             <a:r>
-              <a:rPr lang="en-US" dirty="0" smtClean="0"/>
+              <a:rPr lang="en-US" dirty="0"/>
               <a:t>Click to edit Master title style</a:t>
             </a:r>
-            <a:endParaRPr lang="en-US" dirty="0"/>
           </a:p>
         </p:txBody>
       </p:sp>
@@ -2076,38 +2043,37 @@
           <a:p>
             <a:pPr lvl="0"/>
             <a:r>
-              <a:rPr lang="en-US" smtClean="0"/>
+              <a:rPr lang="en-US"/>
               <a:t>Click to edit Master text styles</a:t>
             </a:r>
           </a:p>
           <a:p>
             <a:pPr lvl="1"/>
             <a:r>
-              <a:rPr lang="en-US" smtClean="0"/>
+              <a:rPr lang="en-US"/>
               <a:t>Second level</a:t>
             </a:r>
           </a:p>
           <a:p>
             <a:pPr lvl="2"/>
             <a:r>
-              <a:rPr lang="en-US" smtClean="0"/>
+              <a:rPr lang="en-US"/>
               <a:t>Third level</a:t>
             </a:r>
           </a:p>
           <a:p>
             <a:pPr lvl="3"/>
             <a:r>
-              <a:rPr lang="en-US" smtClean="0"/>
+              <a:rPr lang="en-US"/>
               <a:t>Fourth level</a:t>
             </a:r>
           </a:p>
           <a:p>
             <a:pPr lvl="4"/>
             <a:r>
-              <a:rPr lang="en-US" smtClean="0"/>
+              <a:rPr lang="en-US"/>
               <a:t>Fifth level</a:t>
             </a:r>
-            <a:endParaRPr lang="en-US"/>
           </a:p>
         </p:txBody>
       </p:sp>
@@ -2128,7 +2094,7 @@
           <a:p>
             <a:fld id="{E22ED4DA-448D-4BB1-B935-CC112220207B}" type="datetime1">
               <a:rPr lang="en-US" smtClean="0"/>
-              <a:t>11/8/2015</a:t>
+              <a:t>11/4/2016</a:t>
             </a:fld>
             <a:endParaRPr lang="en-US"/>
           </a:p>
@@ -2186,13 +2152,6 @@
   <p:clrMapOvr>
     <a:masterClrMapping/>
   </p:clrMapOvr>
-  <p:timing>
-    <p:tnLst>
-      <p:par>
-        <p:cTn id="1" dur="indefinite" restart="never" nodeType="tmRoot"/>
-      </p:par>
-    </p:tnLst>
-  </p:timing>
 </p:sldLayout>
 </file>
 
@@ -2229,10 +2188,9 @@
           <a:lstStyle/>
           <a:p>
             <a:r>
-              <a:rPr lang="en-US" smtClean="0"/>
+              <a:rPr lang="en-US"/>
               <a:t>Click to edit Master title style</a:t>
             </a:r>
-            <a:endParaRPr lang="en-US"/>
           </a:p>
         </p:txBody>
       </p:sp>
@@ -2258,38 +2216,37 @@
           <a:p>
             <a:pPr lvl="0"/>
             <a:r>
-              <a:rPr lang="en-US" dirty="0" smtClean="0"/>
+              <a:rPr lang="en-US" dirty="0"/>
               <a:t>Click to edit Master text styles</a:t>
             </a:r>
           </a:p>
           <a:p>
             <a:pPr lvl="1"/>
             <a:r>
-              <a:rPr lang="en-US" dirty="0" smtClean="0"/>
+              <a:rPr lang="en-US" dirty="0"/>
               <a:t>Second level</a:t>
             </a:r>
           </a:p>
           <a:p>
             <a:pPr lvl="2"/>
             <a:r>
-              <a:rPr lang="en-US" dirty="0" smtClean="0"/>
+              <a:rPr lang="en-US" dirty="0"/>
               <a:t>Third level</a:t>
             </a:r>
           </a:p>
           <a:p>
             <a:pPr lvl="3"/>
             <a:r>
-              <a:rPr lang="en-US" dirty="0" smtClean="0"/>
+              <a:rPr lang="en-US" dirty="0"/>
               <a:t>Fourth level</a:t>
             </a:r>
           </a:p>
           <a:p>
             <a:pPr lvl="4"/>
             <a:r>
-              <a:rPr lang="en-US" dirty="0" smtClean="0"/>
+              <a:rPr lang="en-US" dirty="0"/>
               <a:t>Fifth level</a:t>
             </a:r>
-            <a:endParaRPr lang="en-US" dirty="0"/>
           </a:p>
         </p:txBody>
       </p:sp>
@@ -2310,7 +2267,7 @@
           <a:p>
             <a:fld id="{E22ED4DA-448D-4BB1-B935-CC112220207B}" type="datetime1">
               <a:rPr lang="en-US" smtClean="0"/>
-              <a:t>11/8/2015</a:t>
+              <a:t>11/4/2016</a:t>
             </a:fld>
             <a:endParaRPr lang="en-US"/>
           </a:p>
@@ -2400,7 +2357,7 @@
           <a:lstStyle/>
           <a:p>
             <a:pPr algn="ctr"/>
-            <a:endParaRPr lang="en-US" dirty="0" smtClean="0">
+            <a:endParaRPr lang="en-US" dirty="0">
               <a:solidFill>
                 <a:schemeClr val="tx1"/>
               </a:solidFill>
@@ -2431,11 +2388,11 @@
           <a:lstStyle/>
           <a:p>
             <a:r>
-              <a:rPr lang="en-US" dirty="0" smtClean="0"/>
+              <a:rPr lang="en-US" dirty="0"/>
               <a:t>Resize video to this</a:t>
             </a:r>
             <a:r>
-              <a:rPr lang="en-US" baseline="0" dirty="0" smtClean="0"/>
+              <a:rPr lang="en-US" baseline="0" dirty="0"/>
               <a:t> box.</a:t>
             </a:r>
             <a:endParaRPr lang="en-US" dirty="0"/>
@@ -2452,13 +2409,6 @@
   <p:clrMapOvr>
     <a:masterClrMapping/>
   </p:clrMapOvr>
-  <p:timing>
-    <p:tnLst>
-      <p:par>
-        <p:cTn id="1" dur="indefinite" restart="never" nodeType="tmRoot"/>
-      </p:par>
-    </p:tnLst>
-  </p:timing>
 </p:sldLayout>
 </file>
 
@@ -2495,10 +2445,9 @@
           <a:lstStyle/>
           <a:p>
             <a:r>
-              <a:rPr lang="en-US" smtClean="0"/>
+              <a:rPr lang="en-US"/>
               <a:t>Click to edit Master title style</a:t>
             </a:r>
-            <a:endParaRPr lang="en-US"/>
           </a:p>
         </p:txBody>
       </p:sp>
@@ -2527,38 +2476,37 @@
           <a:p>
             <a:pPr lvl="0"/>
             <a:r>
-              <a:rPr lang="en-US" dirty="0" smtClean="0"/>
+              <a:rPr lang="en-US" dirty="0"/>
               <a:t>Click to edit Master text styles</a:t>
             </a:r>
           </a:p>
           <a:p>
             <a:pPr lvl="1"/>
             <a:r>
-              <a:rPr lang="en-US" dirty="0" smtClean="0"/>
+              <a:rPr lang="en-US" dirty="0"/>
               <a:t>Second level</a:t>
             </a:r>
           </a:p>
           <a:p>
             <a:pPr lvl="2"/>
             <a:r>
-              <a:rPr lang="en-US" dirty="0" smtClean="0"/>
+              <a:rPr lang="en-US" dirty="0"/>
               <a:t>Third level</a:t>
             </a:r>
           </a:p>
           <a:p>
             <a:pPr lvl="3"/>
             <a:r>
-              <a:rPr lang="en-US" dirty="0" smtClean="0"/>
+              <a:rPr lang="en-US" dirty="0"/>
               <a:t>Fourth level</a:t>
             </a:r>
           </a:p>
           <a:p>
             <a:pPr lvl="4"/>
             <a:r>
-              <a:rPr lang="en-US" dirty="0" smtClean="0"/>
+              <a:rPr lang="en-US" dirty="0"/>
               <a:t>Fifth level</a:t>
             </a:r>
-            <a:endParaRPr lang="en-US" dirty="0"/>
           </a:p>
         </p:txBody>
       </p:sp>
@@ -2579,7 +2527,7 @@
           <a:p>
             <a:fld id="{FF5D65A6-AB94-4435-B0B7-3743215FA46C}" type="datetime1">
               <a:rPr lang="en-US" smtClean="0"/>
-              <a:t>11/8/2015</a:t>
+              <a:t>11/4/2016</a:t>
             </a:fld>
             <a:endParaRPr lang="en-US"/>
           </a:p>
@@ -2637,13 +2585,6 @@
   <p:clrMapOvr>
     <a:masterClrMapping/>
   </p:clrMapOvr>
-  <p:timing>
-    <p:tnLst>
-      <p:par>
-        <p:cTn id="1" dur="indefinite" restart="never" nodeType="tmRoot"/>
-      </p:par>
-    </p:tnLst>
-  </p:timing>
 </p:sldLayout>
 </file>
 
@@ -2680,10 +2621,9 @@
           <a:lstStyle/>
           <a:p>
             <a:r>
-              <a:rPr lang="en-US" smtClean="0"/>
+              <a:rPr lang="en-US"/>
               <a:t>Click to edit Master title style</a:t>
             </a:r>
-            <a:endParaRPr lang="en-US"/>
           </a:p>
         </p:txBody>
       </p:sp>
@@ -2741,38 +2681,37 @@
           <a:p>
             <a:pPr lvl="0"/>
             <a:r>
-              <a:rPr lang="en-US" dirty="0" smtClean="0"/>
+              <a:rPr lang="en-US" dirty="0"/>
               <a:t>Click to edit Master text styles</a:t>
             </a:r>
           </a:p>
           <a:p>
             <a:pPr lvl="1"/>
             <a:r>
-              <a:rPr lang="en-US" dirty="0" smtClean="0"/>
+              <a:rPr lang="en-US" dirty="0"/>
               <a:t>Second level</a:t>
             </a:r>
           </a:p>
           <a:p>
             <a:pPr lvl="2"/>
             <a:r>
-              <a:rPr lang="en-US" dirty="0" smtClean="0"/>
+              <a:rPr lang="en-US" dirty="0"/>
               <a:t>Third level</a:t>
             </a:r>
           </a:p>
           <a:p>
             <a:pPr lvl="3"/>
             <a:r>
-              <a:rPr lang="en-US" dirty="0" smtClean="0"/>
+              <a:rPr lang="en-US" dirty="0"/>
               <a:t>Fourth level</a:t>
             </a:r>
           </a:p>
           <a:p>
             <a:pPr lvl="4"/>
             <a:r>
-              <a:rPr lang="en-US" dirty="0" smtClean="0"/>
+              <a:rPr lang="en-US" dirty="0"/>
               <a:t>Fifth level</a:t>
             </a:r>
-            <a:endParaRPr lang="en-US" dirty="0"/>
           </a:p>
         </p:txBody>
       </p:sp>
@@ -2830,38 +2769,37 @@
           <a:p>
             <a:pPr lvl="0"/>
             <a:r>
-              <a:rPr lang="en-US" dirty="0" smtClean="0"/>
+              <a:rPr lang="en-US" dirty="0"/>
               <a:t>Click to edit Master text styles</a:t>
             </a:r>
           </a:p>
           <a:p>
             <a:pPr lvl="1"/>
             <a:r>
-              <a:rPr lang="en-US" dirty="0" smtClean="0"/>
+              <a:rPr lang="en-US" dirty="0"/>
               <a:t>Second level</a:t>
             </a:r>
           </a:p>
           <a:p>
             <a:pPr lvl="2"/>
             <a:r>
-              <a:rPr lang="en-US" dirty="0" smtClean="0"/>
+              <a:rPr lang="en-US" dirty="0"/>
               <a:t>Third level</a:t>
             </a:r>
           </a:p>
           <a:p>
             <a:pPr lvl="3"/>
             <a:r>
-              <a:rPr lang="en-US" dirty="0" smtClean="0"/>
+              <a:rPr lang="en-US" dirty="0"/>
               <a:t>Fourth level</a:t>
             </a:r>
           </a:p>
           <a:p>
             <a:pPr lvl="4"/>
             <a:r>
-              <a:rPr lang="en-US" dirty="0" smtClean="0"/>
+              <a:rPr lang="en-US" dirty="0"/>
               <a:t>Fifth level</a:t>
             </a:r>
-            <a:endParaRPr lang="en-US" dirty="0"/>
           </a:p>
         </p:txBody>
       </p:sp>
@@ -2882,7 +2820,7 @@
           <a:p>
             <a:fld id="{5D1846AD-9252-4647-9435-4C2AC365653A}" type="datetime1">
               <a:rPr lang="en-US" smtClean="0"/>
-              <a:t>11/8/2015</a:t>
+              <a:t>11/4/2016</a:t>
             </a:fld>
             <a:endParaRPr lang="en-US"/>
           </a:p>
@@ -2976,10 +2914,9 @@
           <a:lstStyle/>
           <a:p>
             <a:r>
-              <a:rPr lang="en-US" smtClean="0"/>
+              <a:rPr lang="en-US"/>
               <a:t>Click to edit Master title style</a:t>
             </a:r>
-            <a:endParaRPr lang="en-US"/>
           </a:p>
         </p:txBody>
       </p:sp>
@@ -3008,38 +2945,37 @@
           <a:p>
             <a:pPr lvl="0"/>
             <a:r>
-              <a:rPr lang="en-US" dirty="0" smtClean="0"/>
+              <a:rPr lang="en-US" dirty="0"/>
               <a:t>Click to edit Master text styles</a:t>
             </a:r>
           </a:p>
           <a:p>
             <a:pPr lvl="1"/>
             <a:r>
-              <a:rPr lang="en-US" dirty="0" smtClean="0"/>
+              <a:rPr lang="en-US" dirty="0"/>
               <a:t>Second level</a:t>
             </a:r>
           </a:p>
           <a:p>
             <a:pPr lvl="2"/>
             <a:r>
-              <a:rPr lang="en-US" dirty="0" smtClean="0"/>
+              <a:rPr lang="en-US" dirty="0"/>
               <a:t>Third level</a:t>
             </a:r>
           </a:p>
           <a:p>
             <a:pPr lvl="3"/>
             <a:r>
-              <a:rPr lang="en-US" dirty="0" smtClean="0"/>
+              <a:rPr lang="en-US" dirty="0"/>
               <a:t>Fourth level</a:t>
             </a:r>
           </a:p>
           <a:p>
             <a:pPr lvl="4"/>
             <a:r>
-              <a:rPr lang="en-US" dirty="0" smtClean="0"/>
+              <a:rPr lang="en-US" dirty="0"/>
               <a:t>Fifth level</a:t>
             </a:r>
-            <a:endParaRPr lang="en-US" dirty="0"/>
           </a:p>
         </p:txBody>
       </p:sp>
@@ -3060,7 +2996,7 @@
           <a:p>
             <a:fld id="{FF5D65A6-AB94-4435-B0B7-3743215FA46C}" type="datetime1">
               <a:rPr lang="en-US" smtClean="0"/>
-              <a:t>11/8/2015</a:t>
+              <a:t>11/4/2016</a:t>
             </a:fld>
             <a:endParaRPr lang="en-US"/>
           </a:p>
@@ -3167,13 +3103,6 @@
   <p:clrMapOvr>
     <a:masterClrMapping/>
   </p:clrMapOvr>
-  <p:timing>
-    <p:tnLst>
-      <p:par>
-        <p:cTn id="1" dur="indefinite" restart="never" nodeType="tmRoot"/>
-      </p:par>
-    </p:tnLst>
-  </p:timing>
 </p:sldLayout>
 </file>
 
@@ -3219,10 +3148,9 @@
           </a:lstStyle>
           <a:p>
             <a:r>
-              <a:rPr lang="en-US" smtClean="0"/>
+              <a:rPr lang="en-US"/>
               <a:t>Click to edit Master title style</a:t>
             </a:r>
-            <a:endParaRPr lang="en-US"/>
           </a:p>
         </p:txBody>
       </p:sp>
@@ -3339,7 +3267,7 @@
           <a:p>
             <a:pPr lvl="0"/>
             <a:r>
-              <a:rPr lang="en-US" smtClean="0"/>
+              <a:rPr lang="en-US"/>
               <a:t>Click to edit Master text styles</a:t>
             </a:r>
           </a:p>
@@ -3362,7 +3290,7 @@
           <a:p>
             <a:fld id="{7C193DC4-6EF0-48C9-B29C-616106A645E1}" type="datetime1">
               <a:rPr lang="en-US" smtClean="0"/>
-              <a:t>11/8/2015</a:t>
+              <a:t>11/4/2016</a:t>
             </a:fld>
             <a:endParaRPr lang="en-US"/>
           </a:p>
@@ -3456,10 +3384,9 @@
           <a:lstStyle/>
           <a:p>
             <a:r>
-              <a:rPr lang="en-US" smtClean="0"/>
+              <a:rPr lang="en-US"/>
               <a:t>Click to edit Master title style</a:t>
             </a:r>
-            <a:endParaRPr lang="en-US"/>
           </a:p>
         </p:txBody>
       </p:sp>
@@ -3513,38 +3440,37 @@
           <a:p>
             <a:pPr lvl="0"/>
             <a:r>
-              <a:rPr lang="en-US" smtClean="0"/>
+              <a:rPr lang="en-US"/>
               <a:t>Click to edit Master text styles</a:t>
             </a:r>
           </a:p>
           <a:p>
             <a:pPr lvl="1"/>
             <a:r>
-              <a:rPr lang="en-US" smtClean="0"/>
+              <a:rPr lang="en-US"/>
               <a:t>Second level</a:t>
             </a:r>
           </a:p>
           <a:p>
             <a:pPr lvl="2"/>
             <a:r>
-              <a:rPr lang="en-US" smtClean="0"/>
+              <a:rPr lang="en-US"/>
               <a:t>Third level</a:t>
             </a:r>
           </a:p>
           <a:p>
             <a:pPr lvl="3"/>
             <a:r>
-              <a:rPr lang="en-US" smtClean="0"/>
+              <a:rPr lang="en-US"/>
               <a:t>Fourth level</a:t>
             </a:r>
           </a:p>
           <a:p>
             <a:pPr lvl="4"/>
             <a:r>
-              <a:rPr lang="en-US" smtClean="0"/>
+              <a:rPr lang="en-US"/>
               <a:t>Fifth level</a:t>
             </a:r>
-            <a:endParaRPr lang="en-US"/>
           </a:p>
         </p:txBody>
       </p:sp>
@@ -3598,38 +3524,37 @@
           <a:p>
             <a:pPr lvl="0"/>
             <a:r>
-              <a:rPr lang="en-US" smtClean="0"/>
+              <a:rPr lang="en-US"/>
               <a:t>Click to edit Master text styles</a:t>
             </a:r>
           </a:p>
           <a:p>
             <a:pPr lvl="1"/>
             <a:r>
-              <a:rPr lang="en-US" smtClean="0"/>
+              <a:rPr lang="en-US"/>
               <a:t>Second level</a:t>
             </a:r>
           </a:p>
           <a:p>
             <a:pPr lvl="2"/>
             <a:r>
-              <a:rPr lang="en-US" smtClean="0"/>
+              <a:rPr lang="en-US"/>
               <a:t>Third level</a:t>
             </a:r>
           </a:p>
           <a:p>
             <a:pPr lvl="3"/>
             <a:r>
-              <a:rPr lang="en-US" smtClean="0"/>
+              <a:rPr lang="en-US"/>
               <a:t>Fourth level</a:t>
             </a:r>
           </a:p>
           <a:p>
             <a:pPr lvl="4"/>
             <a:r>
-              <a:rPr lang="en-US" smtClean="0"/>
+              <a:rPr lang="en-US"/>
               <a:t>Fifth level</a:t>
             </a:r>
-            <a:endParaRPr lang="en-US"/>
           </a:p>
         </p:txBody>
       </p:sp>
@@ -3650,7 +3575,7 @@
           <a:p>
             <a:fld id="{5D1846AD-9252-4647-9435-4C2AC365653A}" type="datetime1">
               <a:rPr lang="en-US" smtClean="0"/>
-              <a:t>11/8/2015</a:t>
+              <a:t>11/4/2016</a:t>
             </a:fld>
             <a:endParaRPr lang="en-US"/>
           </a:p>
@@ -3748,10 +3673,9 @@
           </a:lstStyle>
           <a:p>
             <a:r>
-              <a:rPr lang="en-US" smtClean="0"/>
+              <a:rPr lang="en-US"/>
               <a:t>Click to edit Master title style</a:t>
             </a:r>
-            <a:endParaRPr lang="en-US"/>
           </a:p>
         </p:txBody>
       </p:sp>
@@ -3814,7 +3738,7 @@
           <a:p>
             <a:pPr lvl="0"/>
             <a:r>
-              <a:rPr lang="en-US" smtClean="0"/>
+              <a:rPr lang="en-US"/>
               <a:t>Click to edit Master text styles</a:t>
             </a:r>
           </a:p>
@@ -3870,38 +3794,37 @@
           <a:p>
             <a:pPr lvl="0"/>
             <a:r>
-              <a:rPr lang="en-US" smtClean="0"/>
+              <a:rPr lang="en-US"/>
               <a:t>Click to edit Master text styles</a:t>
             </a:r>
           </a:p>
           <a:p>
             <a:pPr lvl="1"/>
             <a:r>
-              <a:rPr lang="en-US" smtClean="0"/>
+              <a:rPr lang="en-US"/>
               <a:t>Second level</a:t>
             </a:r>
           </a:p>
           <a:p>
             <a:pPr lvl="2"/>
             <a:r>
-              <a:rPr lang="en-US" smtClean="0"/>
+              <a:rPr lang="en-US"/>
               <a:t>Third level</a:t>
             </a:r>
           </a:p>
           <a:p>
             <a:pPr lvl="3"/>
             <a:r>
-              <a:rPr lang="en-US" smtClean="0"/>
+              <a:rPr lang="en-US"/>
               <a:t>Fourth level</a:t>
             </a:r>
           </a:p>
           <a:p>
             <a:pPr lvl="4"/>
             <a:r>
-              <a:rPr lang="en-US" smtClean="0"/>
+              <a:rPr lang="en-US"/>
               <a:t>Fifth level</a:t>
             </a:r>
-            <a:endParaRPr lang="en-US"/>
           </a:p>
         </p:txBody>
       </p:sp>
@@ -3964,7 +3887,7 @@
           <a:p>
             <a:pPr lvl="0"/>
             <a:r>
-              <a:rPr lang="en-US" smtClean="0"/>
+              <a:rPr lang="en-US"/>
               <a:t>Click to edit Master text styles</a:t>
             </a:r>
           </a:p>
@@ -4020,38 +3943,37 @@
           <a:p>
             <a:pPr lvl="0"/>
             <a:r>
-              <a:rPr lang="en-US" smtClean="0"/>
+              <a:rPr lang="en-US"/>
               <a:t>Click to edit Master text styles</a:t>
             </a:r>
           </a:p>
           <a:p>
             <a:pPr lvl="1"/>
             <a:r>
-              <a:rPr lang="en-US" smtClean="0"/>
+              <a:rPr lang="en-US"/>
               <a:t>Second level</a:t>
             </a:r>
           </a:p>
           <a:p>
             <a:pPr lvl="2"/>
             <a:r>
-              <a:rPr lang="en-US" smtClean="0"/>
+              <a:rPr lang="en-US"/>
               <a:t>Third level</a:t>
             </a:r>
           </a:p>
           <a:p>
             <a:pPr lvl="3"/>
             <a:r>
-              <a:rPr lang="en-US" smtClean="0"/>
+              <a:rPr lang="en-US"/>
               <a:t>Fourth level</a:t>
             </a:r>
           </a:p>
           <a:p>
             <a:pPr lvl="4"/>
             <a:r>
-              <a:rPr lang="en-US" smtClean="0"/>
+              <a:rPr lang="en-US"/>
               <a:t>Fifth level</a:t>
             </a:r>
-            <a:endParaRPr lang="en-US"/>
           </a:p>
         </p:txBody>
       </p:sp>
@@ -4072,7 +3994,7 @@
           <a:p>
             <a:fld id="{CE56DC10-3561-4063-A6AF-C1CC7A41040A}" type="datetime1">
               <a:rPr lang="en-US" smtClean="0"/>
-              <a:t>11/8/2015</a:t>
+              <a:t>11/4/2016</a:t>
             </a:fld>
             <a:endParaRPr lang="en-US"/>
           </a:p>
@@ -4193,10 +4115,9 @@
           <a:lstStyle/>
           <a:p>
             <a:r>
-              <a:rPr lang="en-US" smtClean="0"/>
+              <a:rPr lang="en-US"/>
               <a:t>Click to edit Master title style</a:t>
             </a:r>
-            <a:endParaRPr lang="en-US"/>
           </a:p>
         </p:txBody>
       </p:sp>
@@ -4227,38 +4148,37 @@
           <a:p>
             <a:pPr lvl="0"/>
             <a:r>
-              <a:rPr lang="en-US" smtClean="0"/>
+              <a:rPr lang="en-US"/>
               <a:t>Click to edit Master text styles</a:t>
             </a:r>
           </a:p>
           <a:p>
             <a:pPr lvl="1"/>
             <a:r>
-              <a:rPr lang="en-US" smtClean="0"/>
+              <a:rPr lang="en-US"/>
               <a:t>Second level</a:t>
             </a:r>
           </a:p>
           <a:p>
             <a:pPr lvl="2"/>
             <a:r>
-              <a:rPr lang="en-US" smtClean="0"/>
+              <a:rPr lang="en-US"/>
               <a:t>Third level</a:t>
             </a:r>
           </a:p>
           <a:p>
             <a:pPr lvl="3"/>
             <a:r>
-              <a:rPr lang="en-US" smtClean="0"/>
+              <a:rPr lang="en-US"/>
               <a:t>Fourth level</a:t>
             </a:r>
           </a:p>
           <a:p>
             <a:pPr lvl="4"/>
             <a:r>
-              <a:rPr lang="en-US" smtClean="0"/>
+              <a:rPr lang="en-US"/>
               <a:t>Fifth level</a:t>
             </a:r>
-            <a:endParaRPr lang="en-US"/>
           </a:p>
         </p:txBody>
       </p:sp>
@@ -4297,7 +4217,7 @@
           <a:p>
             <a:fld id="{02B3F677-983B-48DB-ADFD-63FE6CBC7FB2}" type="datetime1">
               <a:rPr lang="en-US" smtClean="0"/>
-              <a:t>11/8/2015</a:t>
+              <a:t>11/4/2016</a:t>
             </a:fld>
             <a:endParaRPr lang="en-US"/>
           </a:p>
@@ -4406,13 +4326,6 @@
     <p:sldLayoutId id="2147483674" r:id="rId14"/>
     <p:sldLayoutId id="2147483675" r:id="rId15"/>
   </p:sldLayoutIdLst>
-  <p:timing>
-    <p:tnLst>
-      <p:par>
-        <p:cTn id="1" dur="indefinite" restart="never" nodeType="tmRoot"/>
-      </p:par>
-    </p:tnLst>
-  </p:timing>
   <p:hf hdr="0" ftr="0" dt="0"/>
   <p:txStyles>
     <p:titleStyle>
@@ -4700,14 +4613,13 @@
           <a:lstStyle/>
           <a:p>
             <a:r>
-              <a:rPr lang="en-US" dirty="0" err="1" smtClean="0"/>
+              <a:rPr lang="en-US" dirty="0" err="1"/>
               <a:t>Stateful</a:t>
             </a:r>
             <a:r>
-              <a:rPr lang="en-US" dirty="0" smtClean="0"/>
+              <a:rPr lang="en-US" dirty="0"/>
               <a:t> Objects and Stable Identities</a:t>
             </a:r>
-            <a:endParaRPr lang="en-US" dirty="0"/>
           </a:p>
         </p:txBody>
       </p:sp>
@@ -4727,34 +4639,29 @@
           <a:lstStyle/>
           <a:p>
             <a:r>
-              <a:rPr lang="en-US" dirty="0" smtClean="0"/>
+              <a:rPr lang="en-US" dirty="0"/>
               <a:t>CS 5010 Program Design Paradigms</a:t>
             </a:r>
           </a:p>
           <a:p>
             <a:r>
-              <a:rPr lang="en-US" dirty="0" smtClean="0"/>
+              <a:rPr lang="en-US" dirty="0"/>
               <a:t>"</a:t>
             </a:r>
             <a:r>
-              <a:rPr lang="en-US" dirty="0" err="1" smtClean="0"/>
+              <a:rPr lang="en-US" dirty="0" err="1"/>
               <a:t>Bootcamp</a:t>
             </a:r>
             <a:r>
-              <a:rPr lang="en-US" dirty="0" smtClean="0"/>
+              <a:rPr lang="en-US" dirty="0"/>
               <a:t>"</a:t>
             </a:r>
           </a:p>
           <a:p>
             <a:r>
-              <a:rPr lang="en-US" dirty="0" smtClean="0"/>
-              <a:t>Lesson </a:t>
-            </a:r>
-            <a:r>
-              <a:rPr lang="en-US" dirty="0" smtClean="0"/>
-              <a:t>10.2</a:t>
-            </a:r>
-            <a:endParaRPr lang="en-US" dirty="0"/>
+              <a:rPr lang="en-US" dirty="0"/>
+              <a:t>Lesson 10.2</a:t>
+            </a:r>
           </a:p>
         </p:txBody>
       </p:sp>
@@ -4849,28 +4756,13 @@
             <a:p>
               <a:r>
                 <a:rPr lang="en-US" sz="1000" dirty="0"/>
-                <a:t>© Mitchell Wand, </a:t>
+                <a:t>© Mitchell Wand, 2012-2015</a:t>
               </a:r>
-              <a:r>
-                <a:rPr lang="en-US" sz="1000" dirty="0" smtClean="0"/>
-                <a:t>2012-2015</a:t>
-              </a:r>
-              <a:endParaRPr lang="en-US" sz="1000" dirty="0" smtClean="0"/>
             </a:p>
             <a:p>
               <a:r>
-                <a:rPr lang="en-US" sz="1000" dirty="0" smtClean="0"/>
+                <a:rPr lang="en-US" sz="1000" dirty="0"/>
                 <a:t>This work is licensed under a </a:t>
-              </a:r>
-              <a:r>
-                <a:rPr lang="en-US" altLang="en-US" sz="1000" dirty="0" smtClean="0">
-                  <a:solidFill>
-                    <a:srgbClr val="4374B7"/>
-                  </a:solidFill>
-                  <a:latin typeface="Helvetica Neue"/>
-                  <a:hlinkClick r:id="rId4"/>
-                </a:rPr>
-                <a:t>Creative </a:t>
               </a:r>
               <a:r>
                 <a:rPr lang="en-US" altLang="en-US" sz="1000" dirty="0">
@@ -4880,7 +4772,7 @@
                   <a:latin typeface="Helvetica Neue"/>
                   <a:hlinkClick r:id="rId4"/>
                 </a:rPr>
-                <a:t>Commons Attribution-</a:t>
+                <a:t>Creative Commons Attribution-</a:t>
               </a:r>
               <a:r>
                 <a:rPr lang="en-US" altLang="en-US" sz="1000" dirty="0" err="1">
@@ -4903,10 +4795,9 @@
                 <a:t> 4.0 International License</a:t>
               </a:r>
               <a:r>
-                <a:rPr lang="en-US" sz="1000" dirty="0" smtClean="0"/>
+                <a:rPr lang="en-US" sz="1000" dirty="0"/>
                 <a:t>.</a:t>
               </a:r>
-              <a:endParaRPr lang="en-US" sz="1000" dirty="0"/>
             </a:p>
           </p:txBody>
         </p:sp>
@@ -4921,13 +4812,6 @@
   <p:clrMapOvr>
     <a:masterClrMapping/>
   </p:clrMapOvr>
-  <p:timing>
-    <p:tnLst>
-      <p:par>
-        <p:cTn id="1" dur="indefinite" restart="never" nodeType="tmRoot"/>
-      </p:par>
-    </p:tnLst>
-  </p:timing>
 </p:sld>
 </file>
 
@@ -4964,15 +4848,11 @@
           <a:lstStyle/>
           <a:p>
             <a:r>
-              <a:rPr lang="en-US" dirty="0" smtClean="0"/>
-              <a:t>We need to </a:t>
-            </a:r>
-            <a:r>
-              <a:rPr lang="en-US" dirty="0" smtClean="0"/>
-              <a:t>make the wall </a:t>
-            </a:r>
-            <a:r>
-              <a:rPr lang="en-US" dirty="0" err="1" smtClean="0"/>
+              <a:rPr lang="en-US" dirty="0"/>
+              <a:t>We need to make the wall </a:t>
+            </a:r>
+            <a:r>
+              <a:rPr lang="en-US" dirty="0" err="1"/>
               <a:t>stateful</a:t>
             </a:r>
             <a:endParaRPr lang="en-US" dirty="0"/>
@@ -4995,54 +4875,33 @@
           <a:lstStyle/>
           <a:p>
             <a:r>
-              <a:rPr lang="en-US" dirty="0" smtClean="0"/>
-              <a:t>We need to give the </a:t>
-            </a:r>
-            <a:r>
-              <a:rPr lang="en-US" dirty="0" smtClean="0"/>
-              <a:t>wall a </a:t>
-            </a:r>
-            <a:r>
-              <a:rPr lang="en-US" dirty="0" smtClean="0"/>
-              <a:t>stable identity, so balls will know who to ask.</a:t>
-            </a:r>
-          </a:p>
-          <a:p>
-            <a:r>
-              <a:rPr lang="en-US" dirty="0" smtClean="0"/>
-              <a:t>But the information in the </a:t>
-            </a:r>
-            <a:r>
-              <a:rPr lang="en-US" dirty="0" smtClean="0"/>
-              <a:t>wall must </a:t>
-            </a:r>
-            <a:r>
-              <a:rPr lang="en-US" dirty="0" smtClean="0"/>
-              <a:t>change!</a:t>
-            </a:r>
-          </a:p>
-          <a:p>
-            <a:r>
-              <a:rPr lang="en-US" dirty="0" smtClean="0"/>
+              <a:rPr lang="en-US" dirty="0"/>
+              <a:t>We need to give the wall a stable identity, so balls will know who to ask.</a:t>
+            </a:r>
+          </a:p>
+          <a:p>
+            <a:r>
+              <a:rPr lang="en-US" dirty="0"/>
+              <a:t>But the information in the wall must change!</a:t>
+            </a:r>
+          </a:p>
+          <a:p>
+            <a:r>
+              <a:rPr lang="en-US" dirty="0"/>
               <a:t>Solution: we need to make the box MUTABLE.</a:t>
             </a:r>
           </a:p>
           <a:p>
             <a:r>
-              <a:rPr lang="en-US" dirty="0" smtClean="0"/>
-              <a:t>In other words, it should have state</a:t>
-            </a:r>
-            <a:r>
-              <a:rPr lang="en-US" dirty="0" smtClean="0"/>
-              <a:t>.</a:t>
-            </a:r>
-          </a:p>
-          <a:p>
-            <a:r>
-              <a:rPr lang="en-US" dirty="0" smtClean="0"/>
+              <a:rPr lang="en-US" dirty="0"/>
+              <a:t>In other words, it should have state.</a:t>
+            </a:r>
+          </a:p>
+          <a:p>
+            <a:r>
+              <a:rPr lang="en-US" dirty="0"/>
               <a:t>What does that mean? How do we do this?  That is the topic of the next two lessons.</a:t>
             </a:r>
-            <a:endParaRPr lang="en-US" dirty="0"/>
           </a:p>
         </p:txBody>
       </p:sp>
@@ -5079,13 +4938,6 @@
   <p:clrMapOvr>
     <a:masterClrMapping/>
   </p:clrMapOvr>
-  <p:timing>
-    <p:tnLst>
-      <p:par>
-        <p:cTn id="1" dur="indefinite" restart="never" nodeType="tmRoot"/>
-      </p:par>
-    </p:tnLst>
-  </p:timing>
 </p:sld>
 </file>
 
@@ -5122,10 +4974,9 @@
           <a:lstStyle/>
           <a:p>
             <a:r>
-              <a:rPr lang="en-US" dirty="0" smtClean="0"/>
+              <a:rPr lang="en-US" dirty="0"/>
               <a:t>Next Steps</a:t>
             </a:r>
-            <a:endParaRPr lang="en-US" dirty="0"/>
           </a:p>
         </p:txBody>
       </p:sp>
@@ -5145,27 +4996,21 @@
           <a:lstStyle/>
           <a:p>
             <a:r>
-              <a:rPr lang="en-US" dirty="0" smtClean="0"/>
-              <a:t>Study </a:t>
-            </a:r>
-            <a:r>
-              <a:rPr lang="en-US" dirty="0" smtClean="0"/>
-              <a:t>10-2A-ball-and-wall.rkt in the Examples folder.</a:t>
-            </a:r>
-            <a:endParaRPr lang="en-US" dirty="0" smtClean="0"/>
-          </a:p>
-          <a:p>
-            <a:r>
-              <a:rPr lang="en-US" dirty="0" smtClean="0"/>
+              <a:rPr lang="en-US" dirty="0"/>
+              <a:t>Study 10-2A-ball-and-wall.rkt in the Examples folder.</a:t>
+            </a:r>
+          </a:p>
+          <a:p>
+            <a:r>
+              <a:rPr lang="en-US" dirty="0"/>
               <a:t>In the next lesson, we'll consider the difference between real state and simulated state in a little more detail.</a:t>
             </a:r>
           </a:p>
           <a:p>
             <a:r>
-              <a:rPr lang="en-US" dirty="0" smtClean="0"/>
+              <a:rPr lang="en-US" dirty="0"/>
               <a:t>Then we'll consider how to program systems with state in our framework.</a:t>
             </a:r>
-            <a:endParaRPr lang="en-US" dirty="0"/>
           </a:p>
         </p:txBody>
       </p:sp>
@@ -5202,13 +5047,6 @@
   <p:clrMapOvr>
     <a:masterClrMapping/>
   </p:clrMapOvr>
-  <p:timing>
-    <p:tnLst>
-      <p:par>
-        <p:cTn id="1" dur="indefinite" restart="never" nodeType="tmRoot"/>
-      </p:par>
-    </p:tnLst>
-  </p:timing>
 </p:sld>
 </file>
 
@@ -5245,10 +5083,9 @@
           <a:lstStyle/>
           <a:p>
             <a:r>
-              <a:rPr lang="en-US" dirty="0" smtClean="0"/>
-              <a:t>Key Points for Lesson 11.2</a:t>
-            </a:r>
-            <a:endParaRPr lang="en-US" dirty="0"/>
+              <a:rPr lang="en-US" dirty="0"/>
+              <a:t>Key Points for Lesson 10.2</a:t>
+            </a:r>
           </a:p>
         </p:txBody>
       </p:sp>
@@ -5268,30 +5105,29 @@
           <a:lstStyle/>
           <a:p>
             <a:r>
-              <a:rPr lang="en-US" dirty="0" smtClean="0"/>
+              <a:rPr lang="en-US" dirty="0"/>
               <a:t>Sometimes objects need to ask questions of each other over time.</a:t>
             </a:r>
           </a:p>
           <a:p>
             <a:r>
-              <a:rPr lang="en-US" dirty="0" smtClean="0"/>
+              <a:rPr lang="en-US" dirty="0"/>
               <a:t>To accomplish this, the object being queried needs to have a stable identity that the </a:t>
             </a:r>
             <a:r>
-              <a:rPr lang="en-US" dirty="0" err="1" smtClean="0"/>
+              <a:rPr lang="en-US" dirty="0" err="1"/>
               <a:t>querier</a:t>
             </a:r>
             <a:r>
-              <a:rPr lang="en-US" dirty="0" smtClean="0"/>
+              <a:rPr lang="en-US" dirty="0"/>
               <a:t> can rely on.</a:t>
             </a:r>
           </a:p>
           <a:p>
             <a:r>
-              <a:rPr lang="en-US" dirty="0" smtClean="0"/>
+              <a:rPr lang="en-US" dirty="0"/>
               <a:t>In this lesson, we'll show what can happen when this fails.</a:t>
             </a:r>
-            <a:endParaRPr lang="en-US" dirty="0"/>
           </a:p>
         </p:txBody>
       </p:sp>
@@ -5328,13 +5164,6 @@
   <p:clrMapOvr>
     <a:masterClrMapping/>
   </p:clrMapOvr>
-  <p:timing>
-    <p:tnLst>
-      <p:par>
-        <p:cTn id="1" dur="indefinite" restart="never" nodeType="tmRoot"/>
-      </p:par>
-    </p:tnLst>
-  </p:timing>
 </p:sld>
 </file>
 
@@ -5373,10 +5202,9 @@
           <a:lstStyle/>
           <a:p>
             <a:r>
-              <a:rPr lang="en-US" dirty="0" smtClean="0"/>
+              <a:rPr lang="en-US" dirty="0"/>
               <a:t>Sometimes making a new object doesn't do what's needed</a:t>
             </a:r>
-            <a:endParaRPr lang="en-US" dirty="0"/>
           </a:p>
         </p:txBody>
       </p:sp>
@@ -5396,72 +5224,29 @@
           <a:lstStyle/>
           <a:p>
             <a:r>
-              <a:rPr lang="en-US" dirty="0" smtClean="0"/>
-              <a:t>We </a:t>
-            </a:r>
-            <a:r>
-              <a:rPr lang="en-US" dirty="0"/>
-              <a:t>now begin a sequence of programs illustrating patterns of object communication. </a:t>
-            </a:r>
-            <a:endParaRPr lang="en-US" dirty="0" smtClean="0"/>
-          </a:p>
-          <a:p>
-            <a:r>
-              <a:rPr lang="en-US" dirty="0" smtClean="0"/>
-              <a:t>These </a:t>
-            </a:r>
-            <a:r>
-              <a:rPr lang="en-US" dirty="0"/>
-              <a:t>programs will involve a ball bouncing </a:t>
-            </a:r>
-            <a:r>
-              <a:rPr lang="en-US" dirty="0" smtClean="0"/>
-              <a:t>on a canvas</a:t>
-            </a:r>
-            <a:endParaRPr lang="en-US" dirty="0" smtClean="0"/>
-          </a:p>
-          <a:p>
-            <a:r>
-              <a:rPr lang="en-US" dirty="0" smtClean="0"/>
-              <a:t>What’s </a:t>
-            </a:r>
-            <a:r>
-              <a:rPr lang="en-US" dirty="0"/>
-              <a:t>interesting, though, is that the </a:t>
-            </a:r>
-            <a:r>
-              <a:rPr lang="en-US" dirty="0" smtClean="0"/>
-              <a:t>canvas has </a:t>
-            </a:r>
-            <a:r>
-              <a:rPr lang="en-US" dirty="0"/>
-              <a:t>an </a:t>
-            </a:r>
-            <a:r>
-              <a:rPr lang="en-US" dirty="0" err="1" smtClean="0"/>
+              <a:rPr lang="en-US" dirty="0"/>
+              <a:t>We now begin a sequence of programs illustrating patterns of object communication. </a:t>
+            </a:r>
+          </a:p>
+          <a:p>
+            <a:r>
+              <a:rPr lang="en-US" dirty="0"/>
+              <a:t>These programs will involve a ball bouncing on a canvas</a:t>
+            </a:r>
+          </a:p>
+          <a:p>
+            <a:r>
+              <a:rPr lang="en-US" dirty="0"/>
+              <a:t>What’s interesting, though, is that the canvas has an </a:t>
+            </a:r>
+            <a:r>
+              <a:rPr lang="en-US" dirty="0" err="1"/>
               <a:t>draggable</a:t>
             </a:r>
             <a:r>
-              <a:rPr lang="en-US" dirty="0" smtClean="0"/>
-              <a:t> wall</a:t>
-            </a:r>
-            <a:r>
-              <a:rPr lang="en-US" dirty="0"/>
-              <a:t>, so the ball </a:t>
-            </a:r>
-            <a:r>
-              <a:rPr lang="en-US" dirty="0" smtClean="0"/>
-              <a:t>needs to find out about </a:t>
-            </a:r>
-            <a:r>
-              <a:rPr lang="en-US" dirty="0"/>
-              <a:t>the position of the </a:t>
-            </a:r>
-            <a:r>
-              <a:rPr lang="en-US" dirty="0" smtClean="0"/>
-              <a:t>wall at every tick.</a:t>
-            </a:r>
-            <a:endParaRPr lang="en-US" dirty="0"/>
+              <a:rPr lang="en-US" dirty="0"/>
+              <a:t> wall, so the ball needs to find out about the position of the wall at every tick.</a:t>
+            </a:r>
           </a:p>
           <a:p>
             <a:endParaRPr lang="en-US" dirty="0"/>
@@ -5501,13 +5286,6 @@
   <p:clrMapOvr>
     <a:masterClrMapping/>
   </p:clrMapOvr>
-  <p:timing>
-    <p:tnLst>
-      <p:par>
-        <p:cTn id="1" dur="indefinite" restart="never" nodeType="tmRoot"/>
-      </p:par>
-    </p:tnLst>
-  </p:timing>
 </p:sld>
 </file>
 
@@ -5546,10 +5324,9 @@
           <a:lstStyle/>
           <a:p>
             <a:r>
-              <a:rPr lang="en-US" dirty="0" smtClean="0"/>
+              <a:rPr lang="en-US" dirty="0"/>
               <a:t>Let's look at some code: 10-2A-ball-and-wall.rkt</a:t>
             </a:r>
-            <a:endParaRPr lang="en-US" dirty="0"/>
           </a:p>
         </p:txBody>
       </p:sp>
@@ -5571,12 +5348,8 @@
           <a:lstStyle/>
           <a:p>
             <a:r>
-              <a:rPr lang="en-US" dirty="0" smtClean="0"/>
-              <a:t>;; </a:t>
-            </a:r>
-            <a:r>
-              <a:rPr lang="en-US" dirty="0"/>
-              <a:t>The World implements the </a:t>
+              <a:rPr lang="en-US" dirty="0"/>
+              <a:t>;; The World implements the </a:t>
             </a:r>
             <a:r>
               <a:rPr lang="en-US" dirty="0" err="1"/>
@@ -5857,13 +5630,8 @@
           <a:p>
             <a:r>
               <a:rPr lang="en-US" dirty="0"/>
-              <a:t>    ; RETURNS: the state of this object that should follow </a:t>
-            </a:r>
-            <a:r>
-              <a:rPr lang="en-US" dirty="0" smtClean="0"/>
-              <a:t>the next tick</a:t>
-            </a:r>
-            <a:endParaRPr lang="en-US" dirty="0"/>
+              <a:t>    ; RETURNS: the state of this object that should follow the next tick</a:t>
+            </a:r>
           </a:p>
           <a:p>
             <a:r>
@@ -6087,7 +5855,7 @@
           <a:p>
             <a:pPr algn="ctr"/>
             <a:r>
-              <a:rPr lang="en-US" dirty="0" err="1" smtClean="0">
+              <a:rPr lang="en-US" dirty="0" err="1">
                 <a:solidFill>
                   <a:schemeClr val="tx1"/>
                 </a:solidFill>
@@ -6095,18 +5863,13 @@
               <a:t>WorldState</a:t>
             </a:r>
             <a:r>
-              <a:rPr lang="en-US" dirty="0" smtClean="0">
+              <a:rPr lang="en-US" dirty="0">
                 <a:solidFill>
                   <a:schemeClr val="tx1"/>
                 </a:solidFill>
               </a:rPr>
               <a:t>&lt;%&gt; and Widget&lt;%&gt; interfaces as before</a:t>
             </a:r>
-            <a:endParaRPr lang="en-US" dirty="0">
-              <a:solidFill>
-                <a:schemeClr val="tx1"/>
-              </a:solidFill>
-            </a:endParaRPr>
           </a:p>
         </p:txBody>
       </p:sp>
@@ -6156,14 +5919,13 @@
           <a:lstStyle/>
           <a:p>
             <a:r>
-              <a:rPr lang="en-US" b="1" dirty="0" smtClean="0"/>
+              <a:rPr lang="en-US" b="1" dirty="0"/>
               <a:t>Wall&lt;%&gt; </a:t>
             </a:r>
             <a:r>
-              <a:rPr lang="en-US" dirty="0" smtClean="0"/>
+              <a:rPr lang="en-US" dirty="0"/>
               <a:t>interface</a:t>
             </a:r>
-            <a:endParaRPr lang="en-US" dirty="0"/>
           </a:p>
         </p:txBody>
       </p:sp>
@@ -6190,12 +5952,8 @@
               </a:spcBef>
             </a:pPr>
             <a:r>
-              <a:rPr lang="en-US" sz="1700" dirty="0" smtClean="0"/>
-              <a:t>(</a:t>
-            </a:r>
-            <a:r>
               <a:rPr lang="en-US" sz="1700" dirty="0"/>
-              <a:t>define Wall&lt;%&gt;</a:t>
+              <a:t>(define Wall&lt;%&gt;</a:t>
             </a:r>
           </a:p>
           <a:p>
@@ -6354,18 +6112,13 @@
           <a:p>
             <a:pPr algn="ctr"/>
             <a:r>
-              <a:rPr lang="en-US" dirty="0" smtClean="0">
+              <a:rPr lang="en-US" dirty="0">
                 <a:solidFill>
                   <a:schemeClr val="tx1"/>
                 </a:solidFill>
               </a:rPr>
               <a:t>The wall will have an extra method that returns the current position of the wall.   This information is needed by the ball.</a:t>
             </a:r>
-            <a:endParaRPr lang="en-US" dirty="0">
-              <a:solidFill>
-                <a:schemeClr val="tx1"/>
-              </a:solidFill>
-            </a:endParaRPr>
           </a:p>
         </p:txBody>
       </p:sp>
@@ -6416,18 +6169,13 @@
           <a:p>
             <a:pPr algn="ctr"/>
             <a:r>
-              <a:rPr lang="en-US" dirty="0" smtClean="0">
+              <a:rPr lang="en-US" dirty="0">
                 <a:solidFill>
                   <a:schemeClr val="tx1"/>
                 </a:solidFill>
               </a:rPr>
               <a:t>This means that the Wall&lt;%&gt; interface includes all the methods from the Widget&lt;%&gt; interface.  This is called "interface inheritance."</a:t>
             </a:r>
-            <a:endParaRPr lang="en-US" dirty="0">
-              <a:solidFill>
-                <a:schemeClr val="tx1"/>
-              </a:solidFill>
-            </a:endParaRPr>
           </a:p>
         </p:txBody>
       </p:sp>
@@ -6512,10 +6260,9 @@
           <a:lstStyle/>
           <a:p>
             <a:r>
-              <a:rPr lang="en-US" dirty="0" smtClean="0"/>
+              <a:rPr lang="en-US" dirty="0"/>
               <a:t>The Ball% class</a:t>
             </a:r>
-            <a:endParaRPr lang="en-US" dirty="0"/>
           </a:p>
         </p:txBody>
       </p:sp>
@@ -6545,21 +6292,16 @@
               <a:rPr lang="en-US" sz="1400" dirty="0"/>
               <a:t>;; A Ball is a (new Ball% </a:t>
             </a:r>
-            <a:endParaRPr lang="en-US" sz="1400" dirty="0" smtClean="0"/>
-          </a:p>
-          <a:p>
-            <a:pPr>
-              <a:spcBef>
-                <a:spcPts val="0"/>
-              </a:spcBef>
-            </a:pPr>
-            <a:r>
-              <a:rPr lang="en-US" sz="1400" dirty="0" smtClean="0"/>
-              <a:t>;;  [</a:t>
-            </a:r>
+          </a:p>
+          <a:p>
+            <a:pPr>
+              <a:spcBef>
+                <a:spcPts val="0"/>
+              </a:spcBef>
+            </a:pPr>
             <a:r>
               <a:rPr lang="en-US" sz="1400" dirty="0"/>
-              <a:t>x </a:t>
+              <a:t>;;  [x </a:t>
             </a:r>
             <a:r>
               <a:rPr lang="en-US" sz="1400" dirty="0" err="1"/>
@@ -6623,12 +6365,8 @@
               </a:spcBef>
             </a:pPr>
             <a:r>
-              <a:rPr lang="en-US" sz="1400" dirty="0" smtClean="0"/>
-              <a:t>    </a:t>
-            </a:r>
-            <a:r>
               <a:rPr lang="en-US" sz="1400" dirty="0"/>
-              <a:t>(</a:t>
+              <a:t>    (</a:t>
             </a:r>
             <a:r>
               <a:rPr lang="en-US" sz="1400" dirty="0" err="1"/>
@@ -6636,21 +6374,17 @@
             </a:r>
             <a:r>
               <a:rPr lang="en-US" sz="1400" dirty="0"/>
-              <a:t>-field w)  ;; the </a:t>
-            </a:r>
-            <a:r>
-              <a:rPr lang="en-US" sz="1400" dirty="0" smtClean="0"/>
-              <a:t>Wall</a:t>
-            </a:r>
-          </a:p>
-          <a:p>
-            <a:pPr>
-              <a:spcBef>
-                <a:spcPts val="0"/>
-              </a:spcBef>
-            </a:pPr>
-            <a:r>
-              <a:rPr lang="en-US" sz="1400" dirty="0" smtClean="0"/>
+              <a:t>-field w)  ;; the Wall</a:t>
+            </a:r>
+          </a:p>
+          <a:p>
+            <a:pPr>
+              <a:spcBef>
+                <a:spcPts val="0"/>
+              </a:spcBef>
+            </a:pPr>
+            <a:r>
+              <a:rPr lang="en-US" sz="1400" dirty="0"/>
               <a:t>    ...</a:t>
             </a:r>
           </a:p>
@@ -6662,15 +6396,18 @@
             </a:pPr>
             <a:r>
               <a:rPr lang="en-US" sz="1400" dirty="0"/>
-              <a:t> </a:t>
-            </a:r>
-            <a:r>
-              <a:rPr lang="en-US" sz="1400" dirty="0" smtClean="0"/>
-              <a:t>   ;; </a:t>
-            </a:r>
+              <a:t>    ;; after-tick : -&gt; Ball</a:t>
+            </a:r>
+          </a:p>
+          <a:p>
+            <a:pPr>
+              <a:spcBef>
+                <a:spcPts val="0"/>
+              </a:spcBef>
+            </a:pPr>
             <a:r>
               <a:rPr lang="en-US" sz="1400" dirty="0"/>
-              <a:t>after-tick : -&gt; Ball</a:t>
+              <a:t>    ;; RETURNS: state of this ball</a:t>
             </a:r>
           </a:p>
           <a:p>
@@ -6681,38 +6418,7 @@
             </a:pPr>
             <a:r>
               <a:rPr lang="en-US" sz="1400" dirty="0"/>
-              <a:t>    ;; </a:t>
-            </a:r>
-            <a:r>
-              <a:rPr lang="en-US" sz="1400" dirty="0" smtClean="0"/>
-              <a:t>RETURNS: state </a:t>
-            </a:r>
-            <a:r>
-              <a:rPr lang="en-US" sz="1400" dirty="0"/>
-              <a:t>of this </a:t>
-            </a:r>
-            <a:r>
-              <a:rPr lang="en-US" sz="1400" dirty="0" smtClean="0"/>
-              <a:t>ball</a:t>
-            </a:r>
-          </a:p>
-          <a:p>
-            <a:pPr>
-              <a:spcBef>
-                <a:spcPts val="0"/>
-              </a:spcBef>
-            </a:pPr>
-            <a:r>
-              <a:rPr lang="en-US" sz="1400" dirty="0"/>
-              <a:t> </a:t>
-            </a:r>
-            <a:r>
-              <a:rPr lang="en-US" sz="1400" dirty="0" smtClean="0"/>
-              <a:t>   ;; </a:t>
-            </a:r>
-            <a:r>
-              <a:rPr lang="en-US" sz="1400" dirty="0"/>
-              <a:t>after a tick.  </a:t>
+              <a:t>    ;; after a tick.  </a:t>
             </a:r>
           </a:p>
           <a:p>
@@ -6871,15 +6577,18 @@
             </a:pPr>
             <a:r>
               <a:rPr lang="en-US" sz="1400" dirty="0"/>
-              <a:t> </a:t>
-            </a:r>
-            <a:r>
-              <a:rPr lang="en-US" sz="1400" dirty="0" smtClean="0"/>
-              <a:t>   ;; </a:t>
-            </a:r>
+              <a:t>    ;; -&gt; Integer</a:t>
+            </a:r>
+          </a:p>
+          <a:p>
+            <a:pPr>
+              <a:spcBef>
+                <a:spcPts val="0"/>
+              </a:spcBef>
+            </a:pPr>
             <a:r>
               <a:rPr lang="en-US" sz="1400" dirty="0"/>
-              <a:t>-&gt; Integer</a:t>
+              <a:t>    ;; position of the ball at the next</a:t>
             </a:r>
           </a:p>
           <a:p>
@@ -6890,11 +6599,7 @@
             </a:pPr>
             <a:r>
               <a:rPr lang="en-US" sz="1400" dirty="0"/>
-              <a:t>    ;; position of the ball at the </a:t>
-            </a:r>
-            <a:r>
-              <a:rPr lang="en-US" sz="1400" dirty="0" smtClean="0"/>
-              <a:t>next</a:t>
+              <a:t>    ;; tick.</a:t>
             </a:r>
           </a:p>
           <a:p>
@@ -6905,13 +6610,8 @@
             </a:pPr>
             <a:r>
               <a:rPr lang="en-US" sz="1400" dirty="0"/>
-              <a:t> </a:t>
-            </a:r>
-            <a:r>
-              <a:rPr lang="en-US" sz="1400" dirty="0" smtClean="0"/>
-              <a:t>   ;; tick.</a:t>
-            </a:r>
-            <a:endParaRPr lang="en-US" sz="1400" dirty="0"/>
+              <a:t>    ;; STRATEGY: ask the wall for its</a:t>
+            </a:r>
           </a:p>
           <a:p>
             <a:pPr>
@@ -6921,11 +6621,7 @@
             </a:pPr>
             <a:r>
               <a:rPr lang="en-US" sz="1400" dirty="0"/>
-              <a:t>    ;; STRATEGY: ask the wall for </a:t>
-            </a:r>
-            <a:r>
-              <a:rPr lang="en-US" sz="1400" dirty="0" smtClean="0"/>
-              <a:t>its</a:t>
+              <a:t>    ;; position and use that to</a:t>
             </a:r>
           </a:p>
           <a:p>
@@ -6936,49 +6632,18 @@
             </a:pPr>
             <a:r>
               <a:rPr lang="en-US" sz="1400" dirty="0"/>
-              <a:t> </a:t>
-            </a:r>
-            <a:r>
-              <a:rPr lang="en-US" sz="1400" dirty="0" smtClean="0"/>
-              <a:t>   ;; </a:t>
-            </a:r>
+              <a:t>    ;; calculate the upper bound for</a:t>
+            </a:r>
+          </a:p>
+          <a:p>
+            <a:pPr>
+              <a:spcBef>
+                <a:spcPts val="0"/>
+              </a:spcBef>
+            </a:pPr>
             <a:r>
               <a:rPr lang="en-US" sz="1400" dirty="0"/>
-              <a:t>position and use that to</a:t>
-            </a:r>
-          </a:p>
-          <a:p>
-            <a:pPr>
-              <a:spcBef>
-                <a:spcPts val="0"/>
-              </a:spcBef>
-            </a:pPr>
-            <a:r>
-              <a:rPr lang="en-US" sz="1400" dirty="0"/>
-              <a:t>    ;; calculate the upper bound </a:t>
-            </a:r>
-            <a:r>
-              <a:rPr lang="en-US" sz="1400" dirty="0" smtClean="0"/>
-              <a:t>for</a:t>
-            </a:r>
-          </a:p>
-          <a:p>
-            <a:pPr>
-              <a:spcBef>
-                <a:spcPts val="0"/>
-              </a:spcBef>
-            </a:pPr>
-            <a:r>
-              <a:rPr lang="en-US" sz="1400" dirty="0"/>
-              <a:t> </a:t>
-            </a:r>
-            <a:r>
-              <a:rPr lang="en-US" sz="1400" dirty="0" smtClean="0"/>
-              <a:t>   ;; </a:t>
-            </a:r>
-            <a:r>
-              <a:rPr lang="en-US" sz="1400" dirty="0"/>
-              <a:t>the ball's x position</a:t>
+              <a:t>    ;; the ball's x position</a:t>
             </a:r>
           </a:p>
           <a:p>
@@ -7130,11 +6795,7 @@
             </a:r>
             <a:r>
               <a:rPr lang="en-US" sz="1400" dirty="0"/>
-              <a:t>, but limited to </a:t>
-            </a:r>
-            <a:r>
-              <a:rPr lang="en-US" sz="1400" dirty="0" smtClean="0"/>
-              <a:t>the</a:t>
+              <a:t>, but limited to the</a:t>
             </a:r>
           </a:p>
           <a:p>
@@ -7145,15 +6806,7 @@
             </a:pPr>
             <a:r>
               <a:rPr lang="en-US" sz="1400" dirty="0"/>
-              <a:t> </a:t>
-            </a:r>
-            <a:r>
-              <a:rPr lang="en-US" sz="1400" dirty="0" smtClean="0"/>
-              <a:t>   ;; </a:t>
-            </a:r>
-            <a:r>
-              <a:rPr lang="en-US" sz="1400" dirty="0"/>
-              <a:t>range [</a:t>
+              <a:t>    ;; range [</a:t>
             </a:r>
             <a:r>
               <a:rPr lang="en-US" sz="1400" dirty="0" err="1"/>
@@ -7274,26 +6927,13 @@
           <a:p>
             <a:pPr algn="ctr"/>
             <a:r>
-              <a:rPr lang="en-US" sz="1400" dirty="0" smtClean="0">
+              <a:rPr lang="en-US" sz="1400" dirty="0">
                 <a:solidFill>
                   <a:schemeClr val="tx1"/>
                 </a:solidFill>
               </a:rPr>
-              <a:t>At every tick, the ball asks </a:t>
-            </a:r>
-            <a:r>
-              <a:rPr lang="en-US" sz="1400" dirty="0" smtClean="0">
-                <a:solidFill>
-                  <a:schemeClr val="tx1"/>
-                </a:solidFill>
-              </a:rPr>
-              <a:t>w about its position</a:t>
-            </a:r>
-            <a:endParaRPr lang="en-US" sz="1400" dirty="0">
-              <a:solidFill>
-                <a:schemeClr val="tx1"/>
-              </a:solidFill>
-            </a:endParaRPr>
+              <a:t>At every tick, the ball asks w about its position</a:t>
+            </a:r>
           </a:p>
         </p:txBody>
       </p:sp>
@@ -7344,7 +6984,7 @@
           <a:p>
             <a:pPr algn="ctr"/>
             <a:r>
-              <a:rPr lang="en-US" sz="1200" dirty="0" smtClean="0">
+              <a:rPr lang="en-US" sz="1200" dirty="0">
                 <a:solidFill>
                   <a:schemeClr val="tx1"/>
                 </a:solidFill>
@@ -7352,7 +6992,7 @@
               <a:t>The wall is an </a:t>
             </a:r>
             <a:r>
-              <a:rPr lang="en-US" sz="1200" dirty="0" err="1" smtClean="0">
+              <a:rPr lang="en-US" sz="1200" dirty="0" err="1">
                 <a:solidFill>
                   <a:schemeClr val="tx1"/>
                 </a:solidFill>
@@ -7360,18 +7000,13 @@
               <a:t>init</a:t>
             </a:r>
             <a:r>
-              <a:rPr lang="en-US" sz="1200" dirty="0" smtClean="0">
+              <a:rPr lang="en-US" sz="1200" dirty="0">
                 <a:solidFill>
                   <a:schemeClr val="tx1"/>
                 </a:solidFill>
               </a:rPr>
               <a:t>-field of the ball</a:t>
             </a:r>
-            <a:endParaRPr lang="en-US" sz="1200" dirty="0">
-              <a:solidFill>
-                <a:schemeClr val="tx1"/>
-              </a:solidFill>
-            </a:endParaRPr>
           </a:p>
         </p:txBody>
       </p:sp>
@@ -7489,10 +7124,9 @@
           <a:lstStyle/>
           <a:p>
             <a:r>
-              <a:rPr lang="en-US" dirty="0" smtClean="0"/>
+              <a:rPr lang="en-US" dirty="0"/>
               <a:t>The Wall% class</a:t>
             </a:r>
-            <a:endParaRPr lang="en-US" dirty="0"/>
           </a:p>
         </p:txBody>
       </p:sp>
@@ -7600,36 +7234,28 @@
                 <a:spcPts val="0"/>
               </a:spcBef>
             </a:pPr>
-            <a:endParaRPr lang="en-US" sz="1000" dirty="0" smtClean="0"/>
-          </a:p>
-          <a:p>
-            <a:pPr>
-              <a:spcBef>
-                <a:spcPts val="0"/>
-              </a:spcBef>
-            </a:pPr>
-            <a:r>
-              <a:rPr lang="en-US" sz="1000" dirty="0" smtClean="0"/>
-              <a:t>    ;; </a:t>
-            </a:r>
+            <a:endParaRPr lang="en-US" sz="1000" dirty="0"/>
+          </a:p>
+          <a:p>
+            <a:pPr>
+              <a:spcBef>
+                <a:spcPts val="0"/>
+              </a:spcBef>
+            </a:pPr>
             <a:r>
               <a:rPr lang="en-US" sz="1000" dirty="0"/>
-              <a:t>the x position of the wall</a:t>
-            </a:r>
-          </a:p>
-          <a:p>
-            <a:pPr>
-              <a:spcBef>
-                <a:spcPts val="0"/>
-              </a:spcBef>
-            </a:pPr>
-            <a:r>
-              <a:rPr lang="en-US" sz="1000" dirty="0" smtClean="0"/>
-              <a:t>    </a:t>
-            </a:r>
+              <a:t>    ;; the x position of the wall</a:t>
+            </a:r>
+          </a:p>
+          <a:p>
+            <a:pPr>
+              <a:spcBef>
+                <a:spcPts val="0"/>
+              </a:spcBef>
+            </a:pPr>
             <a:r>
               <a:rPr lang="en-US" sz="1000" dirty="0"/>
-              <a:t>(</a:t>
+              <a:t>    (</a:t>
             </a:r>
             <a:r>
               <a:rPr lang="en-US" sz="1000" dirty="0" err="1"/>
@@ -7645,13 +7271,8 @@
             </a:r>
             <a:r>
               <a:rPr lang="en-US" sz="1000" dirty="0"/>
-              <a:t> INITIAL-WALL-POSITION</a:t>
-            </a:r>
-            <a:r>
-              <a:rPr lang="en-US" sz="1000" dirty="0" smtClean="0"/>
-              <a:t>])</a:t>
-            </a:r>
-            <a:endParaRPr lang="en-US" sz="1000" dirty="0"/>
+              <a:t> INITIAL-WALL-POSITION])</a:t>
+            </a:r>
           </a:p>
           <a:p>
             <a:pPr>
@@ -7661,15 +7282,7 @@
             </a:pPr>
             <a:r>
               <a:rPr lang="en-US" sz="1000" dirty="0"/>
-              <a:t>    </a:t>
-            </a:r>
-            <a:r>
-              <a:rPr lang="en-US" sz="1000" dirty="0" smtClean="0"/>
-              <a:t>;; </a:t>
-            </a:r>
-            <a:r>
-              <a:rPr lang="en-US" sz="1000" dirty="0"/>
-              <a:t>is the wall selected? Default is false.</a:t>
+              <a:t>    ;; is the wall selected? Default is false.</a:t>
             </a:r>
           </a:p>
           <a:p>
@@ -7718,11 +7331,7 @@
             </a:pPr>
             <a:r>
               <a:rPr lang="en-US" sz="1000" dirty="0"/>
-              <a:t>    ;; the last button-down event near the </a:t>
-            </a:r>
-            <a:r>
-              <a:rPr lang="en-US" sz="1000" dirty="0" smtClean="0"/>
-              <a:t>wall,</a:t>
+              <a:t>    ;; the last button-down event near the wall,</a:t>
             </a:r>
           </a:p>
           <a:p>
@@ -7733,13 +7342,8 @@
             </a:pPr>
             <a:r>
               <a:rPr lang="en-US" sz="1000" dirty="0"/>
-              <a:t> </a:t>
-            </a:r>
-            <a:r>
-              <a:rPr lang="en-US" sz="1000" dirty="0" smtClean="0"/>
-              <a:t>   ;; relative to the wall position</a:t>
-            </a:r>
-            <a:endParaRPr lang="en-US" sz="1000" dirty="0"/>
+              <a:t>    ;; relative to the wall position</a:t>
+            </a:r>
           </a:p>
           <a:p>
             <a:pPr>
@@ -7854,15 +7458,7 @@
             </a:pPr>
             <a:r>
               <a:rPr lang="en-US" sz="1000" dirty="0"/>
-              <a:t> </a:t>
-            </a:r>
-            <a:r>
-              <a:rPr lang="en-US" sz="1000" dirty="0" smtClean="0"/>
-              <a:t>   ; </a:t>
-            </a:r>
-            <a:r>
-              <a:rPr lang="en-US" sz="1000" dirty="0"/>
-              <a:t>after-button-down : Integer </a:t>
+              <a:t>    ; after-button-down : Integer </a:t>
             </a:r>
             <a:r>
               <a:rPr lang="en-US" sz="1000" dirty="0" err="1"/>
@@ -7892,135 +7488,141 @@
             </a:pPr>
             <a:r>
               <a:rPr lang="en-US" sz="1000" dirty="0"/>
-              <a:t>    ; STRATEGY: Cases on whether the event </a:t>
-            </a:r>
-            <a:r>
-              <a:rPr lang="en-US" sz="1000" dirty="0" smtClean="0"/>
-              <a:t>is near </a:t>
-            </a:r>
-          </a:p>
-          <a:p>
-            <a:pPr>
-              <a:spcBef>
-                <a:spcPts val="0"/>
-              </a:spcBef>
-            </a:pPr>
+              <a:t>    ; STRATEGY: Cases on whether the event is near </a:t>
+            </a:r>
+          </a:p>
+          <a:p>
+            <a:pPr>
+              <a:spcBef>
+                <a:spcPts val="0"/>
+              </a:spcBef>
+            </a:pPr>
+            <a:r>
+              <a:rPr lang="en-US" sz="1000" dirty="0"/>
+              <a:t>    ;  the wall</a:t>
+            </a:r>
+          </a:p>
+          <a:p>
+            <a:pPr>
+              <a:spcBef>
+                <a:spcPts val="0"/>
+              </a:spcBef>
+            </a:pPr>
+            <a:r>
+              <a:rPr lang="en-US" sz="1000" dirty="0"/>
+              <a:t>    ; RETURNS: A wall like this one, but selected, and</a:t>
+            </a:r>
+          </a:p>
+          <a:p>
+            <a:pPr>
+              <a:spcBef>
+                <a:spcPts val="0"/>
+              </a:spcBef>
+            </a:pPr>
+            <a:r>
+              <a:rPr lang="en-US" sz="1000" dirty="0"/>
+              <a:t>    ; with mouse x location (relative to the wall</a:t>
+            </a:r>
+          </a:p>
+          <a:p>
+            <a:pPr>
+              <a:spcBef>
+                <a:spcPts val="0"/>
+              </a:spcBef>
+            </a:pPr>
+            <a:r>
+              <a:rPr lang="en-US" sz="1000" dirty="0"/>
+              <a:t>    ; position) recorded</a:t>
+            </a:r>
+          </a:p>
+          <a:p>
+            <a:pPr>
+              <a:spcBef>
+                <a:spcPts val="0"/>
+              </a:spcBef>
+            </a:pPr>
+            <a:endParaRPr lang="en-US" sz="1000" dirty="0"/>
+          </a:p>
+          <a:p>
+            <a:pPr>
+              <a:spcBef>
+                <a:spcPts val="0"/>
+              </a:spcBef>
+            </a:pPr>
+            <a:r>
+              <a:rPr lang="en-US" sz="1000" dirty="0"/>
+              <a:t>    (define/public (after-button-down mx my)</a:t>
+            </a:r>
+          </a:p>
+          <a:p>
+            <a:pPr>
+              <a:spcBef>
+                <a:spcPts val="0"/>
+              </a:spcBef>
+            </a:pPr>
+            <a:r>
+              <a:rPr lang="en-US" sz="1000" dirty="0"/>
+              <a:t>      (if (near-wall? mx)</a:t>
+            </a:r>
+          </a:p>
+          <a:p>
+            <a:pPr>
+              <a:spcBef>
+                <a:spcPts val="0"/>
+              </a:spcBef>
+            </a:pPr>
+            <a:r>
+              <a:rPr lang="en-US" sz="1000" dirty="0"/>
+              <a:t>        (new Wall%</a:t>
+            </a:r>
+          </a:p>
+          <a:p>
+            <a:pPr>
+              <a:spcBef>
+                <a:spcPts val="0"/>
+              </a:spcBef>
+            </a:pPr>
+            <a:r>
+              <a:rPr lang="en-US" sz="1000" dirty="0"/>
+              <a:t>          [</a:t>
+            </a:r>
+            <a:r>
+              <a:rPr lang="en-US" sz="1000" dirty="0" err="1"/>
+              <a:t>pos</a:t>
+            </a:r>
             <a:r>
               <a:rPr lang="en-US" sz="1000" dirty="0"/>
               <a:t> </a:t>
             </a:r>
             <a:r>
-              <a:rPr lang="en-US" sz="1000" dirty="0" smtClean="0"/>
-              <a:t>   ;  the wall</a:t>
-            </a:r>
-          </a:p>
-          <a:p>
-            <a:pPr>
-              <a:spcBef>
-                <a:spcPts val="0"/>
-              </a:spcBef>
-            </a:pPr>
-            <a:r>
-              <a:rPr lang="en-US" sz="1000" dirty="0"/>
-              <a:t> </a:t>
-            </a:r>
-            <a:r>
-              <a:rPr lang="en-US" sz="1000" dirty="0" smtClean="0"/>
-              <a:t>   ; RETURNS: A wall like this one, but selected, and</a:t>
-            </a:r>
-          </a:p>
-          <a:p>
-            <a:pPr>
-              <a:spcBef>
-                <a:spcPts val="0"/>
-              </a:spcBef>
-            </a:pPr>
-            <a:r>
-              <a:rPr lang="en-US" sz="1000" dirty="0"/>
-              <a:t> </a:t>
-            </a:r>
-            <a:r>
-              <a:rPr lang="en-US" sz="1000" dirty="0" smtClean="0"/>
-              <a:t>   ; with mouse x location (relative to the wall</a:t>
-            </a:r>
-          </a:p>
-          <a:p>
-            <a:pPr>
-              <a:spcBef>
-                <a:spcPts val="0"/>
-              </a:spcBef>
-            </a:pPr>
-            <a:r>
-              <a:rPr lang="en-US" sz="1000" dirty="0"/>
-              <a:t> </a:t>
-            </a:r>
-            <a:r>
-              <a:rPr lang="en-US" sz="1000" dirty="0" smtClean="0"/>
-              <a:t>   ; position) recorded</a:t>
-            </a:r>
-          </a:p>
-          <a:p>
-            <a:pPr>
-              <a:spcBef>
-                <a:spcPts val="0"/>
-              </a:spcBef>
-            </a:pPr>
-            <a:endParaRPr lang="en-US" sz="1000" dirty="0"/>
-          </a:p>
-          <a:p>
-            <a:pPr>
-              <a:spcBef>
-                <a:spcPts val="0"/>
-              </a:spcBef>
-            </a:pPr>
-            <a:r>
-              <a:rPr lang="en-US" sz="1000" dirty="0" smtClean="0"/>
-              <a:t>    (define/public </a:t>
-            </a:r>
-            <a:r>
-              <a:rPr lang="en-US" sz="1000" dirty="0"/>
-              <a:t>(after-button-down mx my)</a:t>
-            </a:r>
-          </a:p>
-          <a:p>
-            <a:pPr>
-              <a:spcBef>
-                <a:spcPts val="0"/>
-              </a:spcBef>
-            </a:pPr>
-            <a:r>
-              <a:rPr lang="en-US" sz="1000" dirty="0"/>
-              <a:t>      (if (near-wall? mx)</a:t>
-            </a:r>
-          </a:p>
-          <a:p>
-            <a:pPr>
-              <a:spcBef>
-                <a:spcPts val="0"/>
-              </a:spcBef>
-            </a:pPr>
-            <a:r>
-              <a:rPr lang="en-US" sz="1000" dirty="0"/>
-              <a:t>        (new Wall%</a:t>
-            </a:r>
-          </a:p>
-          <a:p>
-            <a:pPr>
-              <a:spcBef>
-                <a:spcPts val="0"/>
-              </a:spcBef>
-            </a:pPr>
-            <a:r>
-              <a:rPr lang="en-US" sz="1000" dirty="0"/>
-              <a:t>          [</a:t>
-            </a:r>
-            <a:r>
               <a:rPr lang="en-US" sz="1000" dirty="0" err="1"/>
               <a:t>pos</a:t>
             </a:r>
             <a:r>
               <a:rPr lang="en-US" sz="1000" dirty="0"/>
-              <a:t> </a:t>
+              <a:t>]</a:t>
+            </a:r>
+          </a:p>
+          <a:p>
+            <a:pPr>
+              <a:spcBef>
+                <a:spcPts val="0"/>
+              </a:spcBef>
+            </a:pPr>
+            <a:r>
+              <a:rPr lang="en-US" sz="1000" dirty="0"/>
+              <a:t>          [selected? true]</a:t>
+            </a:r>
+          </a:p>
+          <a:p>
+            <a:pPr>
+              <a:spcBef>
+                <a:spcPts val="0"/>
+              </a:spcBef>
+            </a:pPr>
+            <a:r>
+              <a:rPr lang="en-US" sz="1000" dirty="0"/>
+              <a:t>          [saved-mx (- mx </a:t>
             </a:r>
             <a:r>
               <a:rPr lang="en-US" sz="1000" dirty="0" err="1"/>
@@ -8028,7 +7630,7 @@
             </a:r>
             <a:r>
               <a:rPr lang="en-US" sz="1000" dirty="0"/>
-              <a:t>]</a:t>
+              <a:t>)])</a:t>
             </a:r>
           </a:p>
           <a:p>
@@ -8039,8 +7641,16 @@
             </a:pPr>
             <a:r>
               <a:rPr lang="en-US" sz="1000" dirty="0"/>
-              <a:t>          [selected? true]</a:t>
-            </a:r>
+              <a:t>        this))</a:t>
+            </a:r>
+          </a:p>
+          <a:p>
+            <a:pPr>
+              <a:spcBef>
+                <a:spcPts val="0"/>
+              </a:spcBef>
+            </a:pPr>
+            <a:endParaRPr lang="en-US" sz="1000" dirty="0"/>
           </a:p>
           <a:p>
             <a:pPr>
@@ -8050,57 +7660,7 @@
             </a:pPr>
             <a:r>
               <a:rPr lang="en-US" sz="1000" dirty="0"/>
-              <a:t>          [saved-mx (- mx </a:t>
-            </a:r>
-            <a:r>
-              <a:rPr lang="en-US" sz="1000" dirty="0" err="1"/>
-              <a:t>pos</a:t>
-            </a:r>
-            <a:r>
-              <a:rPr lang="en-US" sz="1000" dirty="0"/>
-              <a:t>)])</a:t>
-            </a:r>
-          </a:p>
-          <a:p>
-            <a:pPr>
-              <a:spcBef>
-                <a:spcPts val="0"/>
-              </a:spcBef>
-            </a:pPr>
-            <a:r>
-              <a:rPr lang="en-US" sz="1000" dirty="0"/>
-              <a:t>        this</a:t>
-            </a:r>
-            <a:r>
-              <a:rPr lang="en-US" sz="1000" dirty="0" smtClean="0"/>
-              <a:t>))</a:t>
-            </a:r>
-          </a:p>
-          <a:p>
-            <a:pPr>
-              <a:spcBef>
-                <a:spcPts val="0"/>
-              </a:spcBef>
-            </a:pPr>
-            <a:endParaRPr lang="en-US" sz="1000" dirty="0"/>
-          </a:p>
-          <a:p>
-            <a:pPr>
-              <a:spcBef>
-                <a:spcPts val="0"/>
-              </a:spcBef>
-            </a:pPr>
-            <a:r>
-              <a:rPr lang="en-US" sz="1000" dirty="0"/>
-              <a:t> </a:t>
-            </a:r>
-            <a:r>
-              <a:rPr lang="en-US" sz="1000" dirty="0" smtClean="0"/>
-              <a:t>   ; </a:t>
-            </a:r>
-            <a:r>
-              <a:rPr lang="en-US" sz="1000" dirty="0"/>
-              <a:t>after-drag : Integer </a:t>
+              <a:t>    ; after-drag : Integer </a:t>
             </a:r>
             <a:r>
               <a:rPr lang="en-US" sz="1000" dirty="0" err="1"/>
@@ -8130,15 +7690,18 @@
             </a:pPr>
             <a:r>
               <a:rPr lang="en-US" sz="1000" dirty="0"/>
-              <a:t>    ; </a:t>
-            </a:r>
-            <a:r>
-              <a:rPr lang="en-US" sz="1000" dirty="0" smtClean="0"/>
-              <a:t>STRATEGY</a:t>
-            </a:r>
+              <a:t>    ; STRATEGY: Cases on whether the wall is selected.</a:t>
+            </a:r>
+          </a:p>
+          <a:p>
+            <a:pPr>
+              <a:spcBef>
+                <a:spcPts val="0"/>
+              </a:spcBef>
+            </a:pPr>
             <a:r>
               <a:rPr lang="en-US" sz="1000" dirty="0"/>
-              <a:t>: Cases on whether the wall is selected.</a:t>
+              <a:t>    ; If it is selected, returns a wall like this one,</a:t>
             </a:r>
           </a:p>
           <a:p>
@@ -8149,30 +7712,7 @@
             </a:pPr>
             <a:r>
               <a:rPr lang="en-US" sz="1000" dirty="0"/>
-              <a:t>    ; If it is selected, returns a wall like this one</a:t>
-            </a:r>
-            <a:r>
-              <a:rPr lang="en-US" sz="1000" dirty="0" smtClean="0"/>
-              <a:t>,</a:t>
-            </a:r>
-          </a:p>
-          <a:p>
-            <a:pPr>
-              <a:spcBef>
-                <a:spcPts val="0"/>
-              </a:spcBef>
-            </a:pPr>
-            <a:r>
-              <a:rPr lang="en-US" sz="1000" dirty="0"/>
-              <a:t> </a:t>
-            </a:r>
-            <a:r>
-              <a:rPr lang="en-US" sz="1000" dirty="0" smtClean="0"/>
-              <a:t>   ; </a:t>
-            </a:r>
-            <a:r>
-              <a:rPr lang="en-US" sz="1000" dirty="0"/>
-              <a:t>except that</a:t>
+              <a:t>    ; except that</a:t>
             </a:r>
           </a:p>
           <a:p>
@@ -8354,18 +7894,13 @@
           <a:p>
             <a:pPr algn="ctr"/>
             <a:r>
-              <a:rPr lang="en-US" dirty="0" smtClean="0">
+              <a:rPr lang="en-US" dirty="0">
                 <a:solidFill>
                   <a:schemeClr val="tx1"/>
                 </a:solidFill>
               </a:rPr>
               <a:t>The code for the Wall% class is perfectly routine</a:t>
             </a:r>
-            <a:endParaRPr lang="en-US" dirty="0">
-              <a:solidFill>
-                <a:schemeClr val="tx1"/>
-              </a:solidFill>
-            </a:endParaRPr>
           </a:p>
         </p:txBody>
       </p:sp>
@@ -8415,10 +7950,9 @@
           <a:lstStyle/>
           <a:p>
             <a:r>
-              <a:rPr lang="en-US" dirty="0" smtClean="0"/>
+              <a:rPr lang="en-US" dirty="0"/>
               <a:t>Here's a demo</a:t>
             </a:r>
-            <a:endParaRPr lang="en-US" dirty="0"/>
           </a:p>
         </p:txBody>
       </p:sp>
@@ -8523,7 +8057,7 @@
           <a:p>
             <a:pPr algn="ctr"/>
             <a:r>
-              <a:rPr lang="en-US" dirty="0" smtClean="0">
+              <a:rPr lang="en-US" dirty="0">
                 <a:solidFill>
                   <a:schemeClr val="tx1"/>
                 </a:solidFill>
@@ -8531,7 +8065,7 @@
               <a:t>If you have difficulty with this video, look at in on </a:t>
             </a:r>
             <a:r>
-              <a:rPr lang="en-US" dirty="0" smtClean="0">
+              <a:rPr lang="en-US" dirty="0">
                 <a:solidFill>
                   <a:schemeClr val="tx1"/>
                 </a:solidFill>
@@ -8540,18 +8074,13 @@
               <a:t>YouTube</a:t>
             </a:r>
             <a:r>
-              <a:rPr lang="en-US" dirty="0" smtClean="0">
+              <a:rPr lang="en-US" dirty="0">
                 <a:solidFill>
                   <a:schemeClr val="tx1"/>
                 </a:solidFill>
               </a:rPr>
               <a:t>, or just run 10-2A-ball-and-wall.rkt .</a:t>
             </a:r>
-            <a:endParaRPr lang="en-US" dirty="0">
-              <a:solidFill>
-                <a:schemeClr val="tx1"/>
-              </a:solidFill>
-            </a:endParaRPr>
           </a:p>
         </p:txBody>
       </p:sp>
@@ -8681,14 +8210,9 @@
           <a:lstStyle/>
           <a:p>
             <a:r>
-              <a:rPr lang="en-US" dirty="0" smtClean="0"/>
-              <a:t>Wha</a:t>
-            </a:r>
-            <a:r>
-              <a:rPr lang="en-US" dirty="0" smtClean="0"/>
-              <a:t>t went wrong?</a:t>
-            </a:r>
-            <a:endParaRPr lang="en-US" dirty="0"/>
+              <a:rPr lang="en-US" dirty="0"/>
+              <a:t>What went wrong?</a:t>
+            </a:r>
           </a:p>
         </p:txBody>
       </p:sp>
@@ -8711,15 +8235,7 @@
           <a:p>
             <a:r>
               <a:rPr lang="en-US" dirty="0"/>
-              <a:t>After a drag, however, the </a:t>
-            </a:r>
-            <a:r>
-              <a:rPr lang="en-US" dirty="0" smtClean="0"/>
-              <a:t>world </a:t>
-            </a:r>
-            <a:r>
-              <a:rPr lang="en-US" dirty="0"/>
-              <a:t>has a </a:t>
+              <a:t>After a drag, however, the world has a </a:t>
             </a:r>
             <a:r>
               <a:rPr lang="en-US" i="1" dirty="0"/>
@@ -8727,30 +8243,20 @@
             </a:r>
             <a:r>
               <a:rPr lang="en-US" dirty="0"/>
-              <a:t> </a:t>
-            </a:r>
-            <a:r>
-              <a:rPr lang="en-US" dirty="0" smtClean="0"/>
-              <a:t>wall at the new position.  </a:t>
-            </a:r>
-            <a:endParaRPr lang="en-US" dirty="0" smtClean="0"/>
-          </a:p>
-          <a:p>
-            <a:r>
-              <a:rPr lang="en-US" dirty="0" smtClean="0"/>
-              <a:t>But </a:t>
-            </a:r>
-            <a:r>
-              <a:rPr lang="en-US" dirty="0" smtClean="0"/>
-              <a:t>the ball still points at the original wall, in the original position.</a:t>
-            </a:r>
-          </a:p>
-          <a:p>
-            <a:r>
-              <a:rPr lang="en-US" dirty="0" smtClean="0"/>
+              <a:t> wall at the new position.  </a:t>
+            </a:r>
+          </a:p>
+          <a:p>
+            <a:r>
+              <a:rPr lang="en-US" dirty="0"/>
+              <a:t>But the ball still points at the original wall, in the original position.</a:t>
+            </a:r>
+          </a:p>
+          <a:p>
+            <a:r>
+              <a:rPr lang="en-US" dirty="0"/>
               <a:t>So the ball bounces at the position where the wall used to be.</a:t>
             </a:r>
-            <a:endParaRPr lang="en-US" dirty="0" smtClean="0"/>
           </a:p>
         </p:txBody>
       </p:sp>
@@ -8787,13 +8293,6 @@
   <p:clrMapOvr>
     <a:masterClrMapping/>
   </p:clrMapOvr>
-  <p:timing>
-    <p:tnLst>
-      <p:par>
-        <p:cTn id="1" dur="indefinite" restart="never" nodeType="tmRoot"/>
-      </p:par>
-    </p:tnLst>
-  </p:timing>
 </p:sld>
 </file>
 

</xml_diff>